<commit_message>
Revert "ultima mod pwp"
This reverts commit 43783fffd0038aaf1790037282d68f08f5ce2491.
</commit_message>
<xml_diff>
--- a/RETO 2 Envío de datos.pptx
+++ b/RETO 2 Envío de datos.pptx
@@ -176,7 +176,7 @@
           <a:noFill/>
           <a:extLst>
             <a:ext uri="{909E8E84-426E-40dd-AFC4-6F175D3DCCD1}">
-              <a14:hiddenFill xmlns="" xmlns:a14="http://schemas.microsoft.com/office/drawing/2010/main">
+              <a14:hiddenFill xmlns:a14="http://schemas.microsoft.com/office/drawing/2010/main" xmlns="">
                 <a:solidFill>
                   <a:srgbClr val="FFFFFF"/>
                 </a:solidFill>
@@ -235,7 +235,7 @@
             </a:ln>
             <a:extLst>
               <a:ext uri="{91240B29-F687-4f45-9708-019B960494DF}">
-                <a14:hiddenLine xmlns="" xmlns:a14="http://schemas.microsoft.com/office/drawing/2010/main" w="9525">
+                <a14:hiddenLine xmlns:a14="http://schemas.microsoft.com/office/drawing/2010/main" xmlns="" w="9525">
                   <a:solidFill>
                     <a:srgbClr val="000000"/>
                   </a:solidFill>
@@ -325,7 +325,7 @@
             </a:ln>
             <a:extLst>
               <a:ext uri="{91240B29-F687-4f45-9708-019B960494DF}">
-                <a14:hiddenLine xmlns="" xmlns:a14="http://schemas.microsoft.com/office/drawing/2010/main" w="9525">
+                <a14:hiddenLine xmlns:a14="http://schemas.microsoft.com/office/drawing/2010/main" xmlns="" w="9525">
                   <a:solidFill>
                     <a:srgbClr val="000000"/>
                   </a:solidFill>
@@ -415,7 +415,7 @@
             </a:ln>
             <a:extLst>
               <a:ext uri="{91240B29-F687-4f45-9708-019B960494DF}">
-                <a14:hiddenLine xmlns="" xmlns:a14="http://schemas.microsoft.com/office/drawing/2010/main" w="9525">
+                <a14:hiddenLine xmlns:a14="http://schemas.microsoft.com/office/drawing/2010/main" xmlns="" w="9525">
                   <a:solidFill>
                     <a:srgbClr val="000000"/>
                   </a:solidFill>
@@ -449,7 +449,7 @@
             </a:ln>
             <a:extLst>
               <a:ext uri="{91240B29-F687-4f45-9708-019B960494DF}">
-                <a14:hiddenLine xmlns="" xmlns:a14="http://schemas.microsoft.com/office/drawing/2010/main" w="9525">
+                <a14:hiddenLine xmlns:a14="http://schemas.microsoft.com/office/drawing/2010/main" xmlns="" w="9525">
                   <a:solidFill>
                     <a:srgbClr val="000000"/>
                   </a:solidFill>
@@ -539,7 +539,7 @@
             </a:ln>
             <a:extLst>
               <a:ext uri="{91240B29-F687-4f45-9708-019B960494DF}">
-                <a14:hiddenLine xmlns="" xmlns:a14="http://schemas.microsoft.com/office/drawing/2010/main" w="9525">
+                <a14:hiddenLine xmlns:a14="http://schemas.microsoft.com/office/drawing/2010/main" xmlns="" w="9525">
                   <a:solidFill>
                     <a:srgbClr val="000000"/>
                   </a:solidFill>
@@ -601,7 +601,7 @@
             </a:ln>
             <a:extLst>
               <a:ext uri="{91240B29-F687-4f45-9708-019B960494DF}">
-                <a14:hiddenLine xmlns="" xmlns:a14="http://schemas.microsoft.com/office/drawing/2010/main" w="9525">
+                <a14:hiddenLine xmlns:a14="http://schemas.microsoft.com/office/drawing/2010/main" xmlns="" w="9525">
                   <a:solidFill>
                     <a:srgbClr val="000000"/>
                   </a:solidFill>
@@ -663,7 +663,7 @@
             </a:ln>
             <a:extLst>
               <a:ext uri="{91240B29-F687-4f45-9708-019B960494DF}">
-                <a14:hiddenLine xmlns="" xmlns:a14="http://schemas.microsoft.com/office/drawing/2010/main" w="9525">
+                <a14:hiddenLine xmlns:a14="http://schemas.microsoft.com/office/drawing/2010/main" xmlns="" w="9525">
                   <a:solidFill>
                     <a:srgbClr val="000000"/>
                   </a:solidFill>
@@ -753,7 +753,7 @@
             </a:ln>
             <a:extLst>
               <a:ext uri="{91240B29-F687-4f45-9708-019B960494DF}">
-                <a14:hiddenLine xmlns="" xmlns:a14="http://schemas.microsoft.com/office/drawing/2010/main" w="9525">
+                <a14:hiddenLine xmlns:a14="http://schemas.microsoft.com/office/drawing/2010/main" xmlns="" w="9525">
                   <a:solidFill>
                     <a:srgbClr val="000000"/>
                   </a:solidFill>
@@ -815,7 +815,7 @@
             </a:ln>
             <a:extLst>
               <a:ext uri="{91240B29-F687-4f45-9708-019B960494DF}">
-                <a14:hiddenLine xmlns="" xmlns:a14="http://schemas.microsoft.com/office/drawing/2010/main" w="9525">
+                <a14:hiddenLine xmlns:a14="http://schemas.microsoft.com/office/drawing/2010/main" xmlns="" w="9525">
                   <a:solidFill>
                     <a:srgbClr val="000000"/>
                   </a:solidFill>
@@ -877,7 +877,7 @@
             </a:ln>
             <a:extLst>
               <a:ext uri="{91240B29-F687-4f45-9708-019B960494DF}">
-                <a14:hiddenLine xmlns="" xmlns:a14="http://schemas.microsoft.com/office/drawing/2010/main" w="9525">
+                <a14:hiddenLine xmlns:a14="http://schemas.microsoft.com/office/drawing/2010/main" xmlns="" w="9525">
                   <a:solidFill>
                     <a:srgbClr val="000000"/>
                   </a:solidFill>
@@ -967,7 +967,7 @@
             </a:ln>
             <a:extLst>
               <a:ext uri="{91240B29-F687-4f45-9708-019B960494DF}">
-                <a14:hiddenLine xmlns="" xmlns:a14="http://schemas.microsoft.com/office/drawing/2010/main" w="9525">
+                <a14:hiddenLine xmlns:a14="http://schemas.microsoft.com/office/drawing/2010/main" xmlns="" w="9525">
                   <a:solidFill>
                     <a:srgbClr val="000000"/>
                   </a:solidFill>
@@ -1057,7 +1057,7 @@
             </a:ln>
             <a:extLst>
               <a:ext uri="{91240B29-F687-4f45-9708-019B960494DF}">
-                <a14:hiddenLine xmlns="" xmlns:a14="http://schemas.microsoft.com/office/drawing/2010/main" w="9525">
+                <a14:hiddenLine xmlns:a14="http://schemas.microsoft.com/office/drawing/2010/main" xmlns="" w="9525">
                   <a:solidFill>
                     <a:srgbClr val="000000"/>
                   </a:solidFill>
@@ -1119,7 +1119,7 @@
             </a:ln>
             <a:extLst>
               <a:ext uri="{91240B29-F687-4f45-9708-019B960494DF}">
-                <a14:hiddenLine xmlns="" xmlns:a14="http://schemas.microsoft.com/office/drawing/2010/main" w="9525">
+                <a14:hiddenLine xmlns:a14="http://schemas.microsoft.com/office/drawing/2010/main" xmlns="" w="9525">
                   <a:solidFill>
                     <a:srgbClr val="000000"/>
                   </a:solidFill>
@@ -1229,7 +1229,7 @@
             </a:ln>
             <a:extLst>
               <a:ext uri="{91240B29-F687-4f45-9708-019B960494DF}">
-                <a14:hiddenLine xmlns="" xmlns:a14="http://schemas.microsoft.com/office/drawing/2010/main" w="9525">
+                <a14:hiddenLine xmlns:a14="http://schemas.microsoft.com/office/drawing/2010/main" xmlns="" w="9525">
                   <a:solidFill>
                     <a:srgbClr val="000000"/>
                   </a:solidFill>
@@ -1291,7 +1291,7 @@
             </a:ln>
             <a:extLst>
               <a:ext uri="{91240B29-F687-4f45-9708-019B960494DF}">
-                <a14:hiddenLine xmlns="" xmlns:a14="http://schemas.microsoft.com/office/drawing/2010/main" w="9525">
+                <a14:hiddenLine xmlns:a14="http://schemas.microsoft.com/office/drawing/2010/main" xmlns="" w="9525">
                   <a:solidFill>
                     <a:srgbClr val="000000"/>
                   </a:solidFill>
@@ -1381,7 +1381,7 @@
             </a:ln>
             <a:extLst>
               <a:ext uri="{91240B29-F687-4f45-9708-019B960494DF}">
-                <a14:hiddenLine xmlns="" xmlns:a14="http://schemas.microsoft.com/office/drawing/2010/main" w="9525">
+                <a14:hiddenLine xmlns:a14="http://schemas.microsoft.com/office/drawing/2010/main" xmlns="" w="9525">
                   <a:solidFill>
                     <a:srgbClr val="000000"/>
                   </a:solidFill>
@@ -1471,7 +1471,7 @@
             </a:ln>
             <a:extLst>
               <a:ext uri="{91240B29-F687-4f45-9708-019B960494DF}">
-                <a14:hiddenLine xmlns="" xmlns:a14="http://schemas.microsoft.com/office/drawing/2010/main" w="9525">
+                <a14:hiddenLine xmlns:a14="http://schemas.microsoft.com/office/drawing/2010/main" xmlns="" w="9525">
                   <a:solidFill>
                     <a:srgbClr val="000000"/>
                   </a:solidFill>
@@ -1533,7 +1533,7 @@
             </a:ln>
             <a:extLst>
               <a:ext uri="{91240B29-F687-4f45-9708-019B960494DF}">
-                <a14:hiddenLine xmlns="" xmlns:a14="http://schemas.microsoft.com/office/drawing/2010/main" w="9525">
+                <a14:hiddenLine xmlns:a14="http://schemas.microsoft.com/office/drawing/2010/main" xmlns="" w="9525">
                   <a:solidFill>
                     <a:srgbClr val="000000"/>
                   </a:solidFill>
@@ -1623,7 +1623,7 @@
             </a:ln>
             <a:extLst>
               <a:ext uri="{91240B29-F687-4f45-9708-019B960494DF}">
-                <a14:hiddenLine xmlns="" xmlns:a14="http://schemas.microsoft.com/office/drawing/2010/main" w="9525">
+                <a14:hiddenLine xmlns:a14="http://schemas.microsoft.com/office/drawing/2010/main" xmlns="" w="9525">
                   <a:solidFill>
                     <a:srgbClr val="000000"/>
                   </a:solidFill>
@@ -1713,7 +1713,7 @@
             </a:ln>
             <a:extLst>
               <a:ext uri="{91240B29-F687-4f45-9708-019B960494DF}">
-                <a14:hiddenLine xmlns="" xmlns:a14="http://schemas.microsoft.com/office/drawing/2010/main" w="9525">
+                <a14:hiddenLine xmlns:a14="http://schemas.microsoft.com/office/drawing/2010/main" xmlns="" w="9525">
                   <a:solidFill>
                     <a:srgbClr val="000000"/>
                   </a:solidFill>
@@ -1769,7 +1769,7 @@
             </a:ln>
             <a:extLst>
               <a:ext uri="{91240B29-F687-4f45-9708-019B960494DF}">
-                <a14:hiddenLine xmlns="" xmlns:a14="http://schemas.microsoft.com/office/drawing/2010/main" w="9525">
+                <a14:hiddenLine xmlns:a14="http://schemas.microsoft.com/office/drawing/2010/main" xmlns="" w="9525">
                   <a:solidFill>
                     <a:srgbClr val="000000"/>
                   </a:solidFill>
@@ -1859,7 +1859,7 @@
             </a:ln>
             <a:extLst>
               <a:ext uri="{91240B29-F687-4f45-9708-019B960494DF}">
-                <a14:hiddenLine xmlns="" xmlns:a14="http://schemas.microsoft.com/office/drawing/2010/main" w="9525">
+                <a14:hiddenLine xmlns:a14="http://schemas.microsoft.com/office/drawing/2010/main" xmlns="" w="9525">
                   <a:solidFill>
                     <a:srgbClr val="000000"/>
                   </a:solidFill>
@@ -1915,7 +1915,7 @@
             </a:ln>
             <a:extLst>
               <a:ext uri="{91240B29-F687-4f45-9708-019B960494DF}">
-                <a14:hiddenLine xmlns="" xmlns:a14="http://schemas.microsoft.com/office/drawing/2010/main" w="9525">
+                <a14:hiddenLine xmlns:a14="http://schemas.microsoft.com/office/drawing/2010/main" xmlns="" w="9525">
                   <a:solidFill>
                     <a:srgbClr val="000000"/>
                   </a:solidFill>
@@ -2005,7 +2005,7 @@
             </a:ln>
             <a:extLst>
               <a:ext uri="{91240B29-F687-4f45-9708-019B960494DF}">
-                <a14:hiddenLine xmlns="" xmlns:a14="http://schemas.microsoft.com/office/drawing/2010/main" w="9525">
+                <a14:hiddenLine xmlns:a14="http://schemas.microsoft.com/office/drawing/2010/main" xmlns="" w="9525">
                   <a:solidFill>
                     <a:srgbClr val="000000"/>
                   </a:solidFill>
@@ -2073,7 +2073,7 @@
             </a:ln>
             <a:extLst>
               <a:ext uri="{91240B29-F687-4f45-9708-019B960494DF}">
-                <a14:hiddenLine xmlns="" xmlns:a14="http://schemas.microsoft.com/office/drawing/2010/main" w="9525">
+                <a14:hiddenLine xmlns:a14="http://schemas.microsoft.com/office/drawing/2010/main" xmlns="" w="9525">
                   <a:solidFill>
                     <a:srgbClr val="000000"/>
                   </a:solidFill>
@@ -2163,7 +2163,7 @@
             </a:ln>
             <a:extLst>
               <a:ext uri="{91240B29-F687-4f45-9708-019B960494DF}">
-                <a14:hiddenLine xmlns="" xmlns:a14="http://schemas.microsoft.com/office/drawing/2010/main" w="9525">
+                <a14:hiddenLine xmlns:a14="http://schemas.microsoft.com/office/drawing/2010/main" xmlns="" w="9525">
                   <a:solidFill>
                     <a:srgbClr val="000000"/>
                   </a:solidFill>
@@ -2231,7 +2231,7 @@
             </a:ln>
             <a:extLst>
               <a:ext uri="{91240B29-F687-4f45-9708-019B960494DF}">
-                <a14:hiddenLine xmlns="" xmlns:a14="http://schemas.microsoft.com/office/drawing/2010/main" w="9525">
+                <a14:hiddenLine xmlns:a14="http://schemas.microsoft.com/office/drawing/2010/main" xmlns="" w="9525">
                   <a:solidFill>
                     <a:srgbClr val="000000"/>
                   </a:solidFill>
@@ -2321,7 +2321,7 @@
             </a:ln>
             <a:extLst>
               <a:ext uri="{91240B29-F687-4f45-9708-019B960494DF}">
-                <a14:hiddenLine xmlns="" xmlns:a14="http://schemas.microsoft.com/office/drawing/2010/main" w="9525">
+                <a14:hiddenLine xmlns:a14="http://schemas.microsoft.com/office/drawing/2010/main" xmlns="" w="9525">
                   <a:solidFill>
                     <a:srgbClr val="000000"/>
                   </a:solidFill>
@@ -2355,7 +2355,7 @@
             </a:ln>
             <a:extLst>
               <a:ext uri="{91240B29-F687-4f45-9708-019B960494DF}">
-                <a14:hiddenLine xmlns="" xmlns:a14="http://schemas.microsoft.com/office/drawing/2010/main" w="9525">
+                <a14:hiddenLine xmlns:a14="http://schemas.microsoft.com/office/drawing/2010/main" xmlns="" w="9525">
                   <a:solidFill>
                     <a:srgbClr val="000000"/>
                   </a:solidFill>
@@ -2445,7 +2445,7 @@
             </a:ln>
             <a:extLst>
               <a:ext uri="{91240B29-F687-4f45-9708-019B960494DF}">
-                <a14:hiddenLine xmlns="" xmlns:a14="http://schemas.microsoft.com/office/drawing/2010/main" w="9525">
+                <a14:hiddenLine xmlns:a14="http://schemas.microsoft.com/office/drawing/2010/main" xmlns="" w="9525">
                   <a:solidFill>
                     <a:srgbClr val="000000"/>
                   </a:solidFill>
@@ -2507,7 +2507,7 @@
             </a:ln>
             <a:extLst>
               <a:ext uri="{91240B29-F687-4f45-9708-019B960494DF}">
-                <a14:hiddenLine xmlns="" xmlns:a14="http://schemas.microsoft.com/office/drawing/2010/main" w="9525">
+                <a14:hiddenLine xmlns:a14="http://schemas.microsoft.com/office/drawing/2010/main" xmlns="" w="9525">
                   <a:solidFill>
                     <a:srgbClr val="000000"/>
                   </a:solidFill>
@@ -2569,7 +2569,7 @@
             </a:ln>
             <a:extLst>
               <a:ext uri="{91240B29-F687-4f45-9708-019B960494DF}">
-                <a14:hiddenLine xmlns="" xmlns:a14="http://schemas.microsoft.com/office/drawing/2010/main" w="9525">
+                <a14:hiddenLine xmlns:a14="http://schemas.microsoft.com/office/drawing/2010/main" xmlns="" w="9525">
                   <a:solidFill>
                     <a:srgbClr val="000000"/>
                   </a:solidFill>
@@ -2659,7 +2659,7 @@
             </a:ln>
             <a:extLst>
               <a:ext uri="{91240B29-F687-4f45-9708-019B960494DF}">
-                <a14:hiddenLine xmlns="" xmlns:a14="http://schemas.microsoft.com/office/drawing/2010/main" w="9525">
+                <a14:hiddenLine xmlns:a14="http://schemas.microsoft.com/office/drawing/2010/main" xmlns="" w="9525">
                   <a:solidFill>
                     <a:srgbClr val="000000"/>
                   </a:solidFill>
@@ -2727,7 +2727,7 @@
             </a:ln>
             <a:extLst>
               <a:ext uri="{91240B29-F687-4f45-9708-019B960494DF}">
-                <a14:hiddenLine xmlns="" xmlns:a14="http://schemas.microsoft.com/office/drawing/2010/main" w="9525">
+                <a14:hiddenLine xmlns:a14="http://schemas.microsoft.com/office/drawing/2010/main" xmlns="" w="9525">
                   <a:solidFill>
                     <a:srgbClr val="000000"/>
                   </a:solidFill>
@@ -2789,7 +2789,7 @@
             </a:ln>
             <a:extLst>
               <a:ext uri="{91240B29-F687-4f45-9708-019B960494DF}">
-                <a14:hiddenLine xmlns="" xmlns:a14="http://schemas.microsoft.com/office/drawing/2010/main" w="9525">
+                <a14:hiddenLine xmlns:a14="http://schemas.microsoft.com/office/drawing/2010/main" xmlns="" w="9525">
                   <a:solidFill>
                     <a:srgbClr val="000000"/>
                   </a:solidFill>
@@ -2879,7 +2879,7 @@
             </a:ln>
             <a:extLst>
               <a:ext uri="{91240B29-F687-4f45-9708-019B960494DF}">
-                <a14:hiddenLine xmlns="" xmlns:a14="http://schemas.microsoft.com/office/drawing/2010/main" w="9525">
+                <a14:hiddenLine xmlns:a14="http://schemas.microsoft.com/office/drawing/2010/main" xmlns="" w="9525">
                   <a:solidFill>
                     <a:srgbClr val="000000"/>
                   </a:solidFill>
@@ -2941,7 +2941,7 @@
             </a:ln>
             <a:extLst>
               <a:ext uri="{91240B29-F687-4f45-9708-019B960494DF}">
-                <a14:hiddenLine xmlns="" xmlns:a14="http://schemas.microsoft.com/office/drawing/2010/main" w="9525">
+                <a14:hiddenLine xmlns:a14="http://schemas.microsoft.com/office/drawing/2010/main" xmlns="" w="9525">
                   <a:solidFill>
                     <a:srgbClr val="000000"/>
                   </a:solidFill>
@@ -3031,7 +3031,7 @@
             </a:ln>
             <a:extLst>
               <a:ext uri="{91240B29-F687-4f45-9708-019B960494DF}">
-                <a14:hiddenLine xmlns="" xmlns:a14="http://schemas.microsoft.com/office/drawing/2010/main" w="9525">
+                <a14:hiddenLine xmlns:a14="http://schemas.microsoft.com/office/drawing/2010/main" xmlns="" w="9525">
                   <a:solidFill>
                     <a:srgbClr val="000000"/>
                   </a:solidFill>
@@ -3093,7 +3093,7 @@
             </a:ln>
             <a:extLst>
               <a:ext uri="{91240B29-F687-4f45-9708-019B960494DF}">
-                <a14:hiddenLine xmlns="" xmlns:a14="http://schemas.microsoft.com/office/drawing/2010/main" w="9525">
+                <a14:hiddenLine xmlns:a14="http://schemas.microsoft.com/office/drawing/2010/main" xmlns="" w="9525">
                   <a:solidFill>
                     <a:srgbClr val="000000"/>
                   </a:solidFill>
@@ -3183,7 +3183,7 @@
             </a:ln>
             <a:extLst>
               <a:ext uri="{91240B29-F687-4f45-9708-019B960494DF}">
-                <a14:hiddenLine xmlns="" xmlns:a14="http://schemas.microsoft.com/office/drawing/2010/main" w="9525">
+                <a14:hiddenLine xmlns:a14="http://schemas.microsoft.com/office/drawing/2010/main" xmlns="" w="9525">
                   <a:solidFill>
                     <a:srgbClr val="000000"/>
                   </a:solidFill>
@@ -3217,7 +3217,7 @@
             </a:ln>
             <a:extLst>
               <a:ext uri="{91240B29-F687-4f45-9708-019B960494DF}">
-                <a14:hiddenLine xmlns="" xmlns:a14="http://schemas.microsoft.com/office/drawing/2010/main" w="9525">
+                <a14:hiddenLine xmlns:a14="http://schemas.microsoft.com/office/drawing/2010/main" xmlns="" w="9525">
                   <a:solidFill>
                     <a:srgbClr val="000000"/>
                   </a:solidFill>
@@ -3282,7 +3282,7 @@
             </a:ln>
             <a:extLst>
               <a:ext uri="{91240B29-F687-4f45-9708-019B960494DF}">
-                <a14:hiddenLine xmlns="" xmlns:a14="http://schemas.microsoft.com/office/drawing/2010/main" w="9525">
+                <a14:hiddenLine xmlns:a14="http://schemas.microsoft.com/office/drawing/2010/main" xmlns="" w="9525">
                   <a:solidFill>
                     <a:srgbClr val="000000"/>
                   </a:solidFill>
@@ -3372,7 +3372,7 @@
             </a:ln>
             <a:extLst>
               <a:ext uri="{91240B29-F687-4f45-9708-019B960494DF}">
-                <a14:hiddenLine xmlns="" xmlns:a14="http://schemas.microsoft.com/office/drawing/2010/main" w="9525">
+                <a14:hiddenLine xmlns:a14="http://schemas.microsoft.com/office/drawing/2010/main" xmlns="" w="9525">
                   <a:solidFill>
                     <a:srgbClr val="000000"/>
                   </a:solidFill>
@@ -3434,7 +3434,7 @@
             </a:ln>
             <a:extLst>
               <a:ext uri="{91240B29-F687-4f45-9708-019B960494DF}">
-                <a14:hiddenLine xmlns="" xmlns:a14="http://schemas.microsoft.com/office/drawing/2010/main" w="9525">
+                <a14:hiddenLine xmlns:a14="http://schemas.microsoft.com/office/drawing/2010/main" xmlns="" w="9525">
                   <a:solidFill>
                     <a:srgbClr val="000000"/>
                   </a:solidFill>
@@ -3524,7 +3524,7 @@
             </a:ln>
             <a:extLst>
               <a:ext uri="{91240B29-F687-4f45-9708-019B960494DF}">
-                <a14:hiddenLine xmlns="" xmlns:a14="http://schemas.microsoft.com/office/drawing/2010/main" w="9525">
+                <a14:hiddenLine xmlns:a14="http://schemas.microsoft.com/office/drawing/2010/main" xmlns="" w="9525">
                   <a:solidFill>
                     <a:srgbClr val="000000"/>
                   </a:solidFill>
@@ -3614,7 +3614,7 @@
             </a:ln>
             <a:extLst>
               <a:ext uri="{91240B29-F687-4f45-9708-019B960494DF}">
-                <a14:hiddenLine xmlns="" xmlns:a14="http://schemas.microsoft.com/office/drawing/2010/main" w="9525">
+                <a14:hiddenLine xmlns:a14="http://schemas.microsoft.com/office/drawing/2010/main" xmlns="" w="9525">
                   <a:solidFill>
                     <a:srgbClr val="000000"/>
                   </a:solidFill>
@@ -3679,7 +3679,7 @@
             </a:ln>
             <a:extLst>
               <a:ext uri="{91240B29-F687-4f45-9708-019B960494DF}">
-                <a14:hiddenLine xmlns="" xmlns:a14="http://schemas.microsoft.com/office/drawing/2010/main" w="9525">
+                <a14:hiddenLine xmlns:a14="http://schemas.microsoft.com/office/drawing/2010/main" xmlns="" w="9525">
                   <a:solidFill>
                     <a:srgbClr val="000000"/>
                   </a:solidFill>
@@ -3741,7 +3741,7 @@
             </a:ln>
             <a:extLst>
               <a:ext uri="{91240B29-F687-4f45-9708-019B960494DF}">
-                <a14:hiddenLine xmlns="" xmlns:a14="http://schemas.microsoft.com/office/drawing/2010/main" w="9525">
+                <a14:hiddenLine xmlns:a14="http://schemas.microsoft.com/office/drawing/2010/main" xmlns="" w="9525">
                   <a:solidFill>
                     <a:srgbClr val="000000"/>
                   </a:solidFill>
@@ -3831,7 +3831,7 @@
             </a:ln>
             <a:extLst>
               <a:ext uri="{91240B29-F687-4f45-9708-019B960494DF}">
-                <a14:hiddenLine xmlns="" xmlns:a14="http://schemas.microsoft.com/office/drawing/2010/main" w="9525">
+                <a14:hiddenLine xmlns:a14="http://schemas.microsoft.com/office/drawing/2010/main" xmlns="" w="9525">
                   <a:solidFill>
                     <a:srgbClr val="000000"/>
                   </a:solidFill>
@@ -3921,7 +3921,7 @@
             </a:ln>
             <a:extLst>
               <a:ext uri="{91240B29-F687-4f45-9708-019B960494DF}">
-                <a14:hiddenLine xmlns="" xmlns:a14="http://schemas.microsoft.com/office/drawing/2010/main" w="9525">
+                <a14:hiddenLine xmlns:a14="http://schemas.microsoft.com/office/drawing/2010/main" xmlns="" w="9525">
                   <a:solidFill>
                     <a:srgbClr val="000000"/>
                   </a:solidFill>
@@ -3983,7 +3983,7 @@
             </a:ln>
             <a:extLst>
               <a:ext uri="{91240B29-F687-4f45-9708-019B960494DF}">
-                <a14:hiddenLine xmlns="" xmlns:a14="http://schemas.microsoft.com/office/drawing/2010/main" w="9525">
+                <a14:hiddenLine xmlns:a14="http://schemas.microsoft.com/office/drawing/2010/main" xmlns="" w="9525">
                   <a:solidFill>
                     <a:srgbClr val="000000"/>
                   </a:solidFill>
@@ -4103,7 +4103,7 @@
             </a:ln>
             <a:extLst>
               <a:ext uri="{91240B29-F687-4f45-9708-019B960494DF}">
-                <a14:hiddenLine xmlns="" xmlns:a14="http://schemas.microsoft.com/office/drawing/2010/main" w="9525">
+                <a14:hiddenLine xmlns:a14="http://schemas.microsoft.com/office/drawing/2010/main" xmlns="" w="9525">
                   <a:solidFill>
                     <a:srgbClr val="000000"/>
                   </a:solidFill>
@@ -4171,7 +4171,7 @@
             </a:ln>
             <a:extLst>
               <a:ext uri="{91240B29-F687-4f45-9708-019B960494DF}">
-                <a14:hiddenLine xmlns="" xmlns:a14="http://schemas.microsoft.com/office/drawing/2010/main" w="9525">
+                <a14:hiddenLine xmlns:a14="http://schemas.microsoft.com/office/drawing/2010/main" xmlns="" w="9525">
                   <a:solidFill>
                     <a:srgbClr val="000000"/>
                   </a:solidFill>
@@ -4261,7 +4261,7 @@
             </a:ln>
             <a:extLst>
               <a:ext uri="{91240B29-F687-4f45-9708-019B960494DF}">
-                <a14:hiddenLine xmlns="" xmlns:a14="http://schemas.microsoft.com/office/drawing/2010/main" w="9525">
+                <a14:hiddenLine xmlns:a14="http://schemas.microsoft.com/office/drawing/2010/main" xmlns="" w="9525">
                   <a:solidFill>
                     <a:srgbClr val="000000"/>
                   </a:solidFill>
@@ -9092,7 +9092,7 @@
           <a:noFill/>
           <a:extLst>
             <a:ext uri="{909E8E84-426E-40dd-AFC4-6F175D3DCCD1}">
-              <a14:hiddenFill xmlns="" xmlns:a14="http://schemas.microsoft.com/office/drawing/2010/main">
+              <a14:hiddenFill xmlns:a14="http://schemas.microsoft.com/office/drawing/2010/main" xmlns="">
                 <a:solidFill>
                   <a:srgbClr val="FFFFFF"/>
                 </a:solidFill>
@@ -9166,7 +9166,7 @@
               </a:ln>
               <a:extLst>
                 <a:ext uri="{91240B29-F687-4f45-9708-019B960494DF}">
-                  <a14:hiddenLine xmlns="" xmlns:a14="http://schemas.microsoft.com/office/drawing/2010/main" w="9525">
+                  <a14:hiddenLine xmlns:a14="http://schemas.microsoft.com/office/drawing/2010/main" xmlns="" w="9525">
                     <a:solidFill>
                       <a:srgbClr val="000000"/>
                     </a:solidFill>
@@ -9256,7 +9256,7 @@
               </a:ln>
               <a:extLst>
                 <a:ext uri="{91240B29-F687-4f45-9708-019B960494DF}">
-                  <a14:hiddenLine xmlns="" xmlns:a14="http://schemas.microsoft.com/office/drawing/2010/main" w="9525">
+                  <a14:hiddenLine xmlns:a14="http://schemas.microsoft.com/office/drawing/2010/main" xmlns="" w="9525">
                     <a:solidFill>
                       <a:srgbClr val="000000"/>
                     </a:solidFill>
@@ -9346,7 +9346,7 @@
               </a:ln>
               <a:extLst>
                 <a:ext uri="{91240B29-F687-4f45-9708-019B960494DF}">
-                  <a14:hiddenLine xmlns="" xmlns:a14="http://schemas.microsoft.com/office/drawing/2010/main" w="9525">
+                  <a14:hiddenLine xmlns:a14="http://schemas.microsoft.com/office/drawing/2010/main" xmlns="" w="9525">
                     <a:solidFill>
                       <a:srgbClr val="000000"/>
                     </a:solidFill>
@@ -9408,7 +9408,7 @@
               </a:ln>
               <a:extLst>
                 <a:ext uri="{91240B29-F687-4f45-9708-019B960494DF}">
-                  <a14:hiddenLine xmlns="" xmlns:a14="http://schemas.microsoft.com/office/drawing/2010/main" w="9525">
+                  <a14:hiddenLine xmlns:a14="http://schemas.microsoft.com/office/drawing/2010/main" xmlns="" w="9525">
                     <a:solidFill>
                       <a:srgbClr val="000000"/>
                     </a:solidFill>
@@ -9498,7 +9498,7 @@
               </a:ln>
               <a:extLst>
                 <a:ext uri="{91240B29-F687-4f45-9708-019B960494DF}">
-                  <a14:hiddenLine xmlns="" xmlns:a14="http://schemas.microsoft.com/office/drawing/2010/main" w="9525">
+                  <a14:hiddenLine xmlns:a14="http://schemas.microsoft.com/office/drawing/2010/main" xmlns="" w="9525">
                     <a:solidFill>
                       <a:srgbClr val="000000"/>
                     </a:solidFill>
@@ -9560,7 +9560,7 @@
               </a:ln>
               <a:extLst>
                 <a:ext uri="{91240B29-F687-4f45-9708-019B960494DF}">
-                  <a14:hiddenLine xmlns="" xmlns:a14="http://schemas.microsoft.com/office/drawing/2010/main" w="9525">
+                  <a14:hiddenLine xmlns:a14="http://schemas.microsoft.com/office/drawing/2010/main" xmlns="" w="9525">
                     <a:solidFill>
                       <a:srgbClr val="000000"/>
                     </a:solidFill>
@@ -9622,7 +9622,7 @@
               </a:ln>
               <a:extLst>
                 <a:ext uri="{91240B29-F687-4f45-9708-019B960494DF}">
-                  <a14:hiddenLine xmlns="" xmlns:a14="http://schemas.microsoft.com/office/drawing/2010/main" w="9525">
+                  <a14:hiddenLine xmlns:a14="http://schemas.microsoft.com/office/drawing/2010/main" xmlns="" w="9525">
                     <a:solidFill>
                       <a:srgbClr val="000000"/>
                     </a:solidFill>
@@ -9712,7 +9712,7 @@
               </a:ln>
               <a:extLst>
                 <a:ext uri="{91240B29-F687-4f45-9708-019B960494DF}">
-                  <a14:hiddenLine xmlns="" xmlns:a14="http://schemas.microsoft.com/office/drawing/2010/main" w="9525">
+                  <a14:hiddenLine xmlns:a14="http://schemas.microsoft.com/office/drawing/2010/main" xmlns="" w="9525">
                     <a:solidFill>
                       <a:srgbClr val="000000"/>
                     </a:solidFill>
@@ -9802,7 +9802,7 @@
               </a:ln>
               <a:extLst>
                 <a:ext uri="{91240B29-F687-4f45-9708-019B960494DF}">
-                  <a14:hiddenLine xmlns="" xmlns:a14="http://schemas.microsoft.com/office/drawing/2010/main" w="9525">
+                  <a14:hiddenLine xmlns:a14="http://schemas.microsoft.com/office/drawing/2010/main" xmlns="" w="9525">
                     <a:solidFill>
                       <a:srgbClr val="000000"/>
                     </a:solidFill>
@@ -9864,7 +9864,7 @@
               </a:ln>
               <a:extLst>
                 <a:ext uri="{91240B29-F687-4f45-9708-019B960494DF}">
-                  <a14:hiddenLine xmlns="" xmlns:a14="http://schemas.microsoft.com/office/drawing/2010/main" w="9525">
+                  <a14:hiddenLine xmlns:a14="http://schemas.microsoft.com/office/drawing/2010/main" xmlns="" w="9525">
                     <a:solidFill>
                       <a:srgbClr val="000000"/>
                     </a:solidFill>
@@ -9974,7 +9974,7 @@
               </a:ln>
               <a:extLst>
                 <a:ext uri="{91240B29-F687-4f45-9708-019B960494DF}">
-                  <a14:hiddenLine xmlns="" xmlns:a14="http://schemas.microsoft.com/office/drawing/2010/main" w="9525">
+                  <a14:hiddenLine xmlns:a14="http://schemas.microsoft.com/office/drawing/2010/main" xmlns="" w="9525">
                     <a:solidFill>
                       <a:srgbClr val="000000"/>
                     </a:solidFill>
@@ -10058,7 +10058,7 @@
               </a:ln>
               <a:extLst>
                 <a:ext uri="{91240B29-F687-4f45-9708-019B960494DF}">
-                  <a14:hiddenLine xmlns="" xmlns:a14="http://schemas.microsoft.com/office/drawing/2010/main" w="9525">
+                  <a14:hiddenLine xmlns:a14="http://schemas.microsoft.com/office/drawing/2010/main" xmlns="" w="9525">
                     <a:solidFill>
                       <a:srgbClr val="000000"/>
                     </a:solidFill>
@@ -10120,7 +10120,7 @@
               </a:ln>
               <a:extLst>
                 <a:ext uri="{91240B29-F687-4f45-9708-019B960494DF}">
-                  <a14:hiddenLine xmlns="" xmlns:a14="http://schemas.microsoft.com/office/drawing/2010/main" w="9525">
+                  <a14:hiddenLine xmlns:a14="http://schemas.microsoft.com/office/drawing/2010/main" xmlns="" w="9525">
                     <a:solidFill>
                       <a:srgbClr val="000000"/>
                     </a:solidFill>
@@ -10182,7 +10182,7 @@
               </a:ln>
               <a:extLst>
                 <a:ext uri="{91240B29-F687-4f45-9708-019B960494DF}">
-                  <a14:hiddenLine xmlns="" xmlns:a14="http://schemas.microsoft.com/office/drawing/2010/main" w="9525">
+                  <a14:hiddenLine xmlns:a14="http://schemas.microsoft.com/office/drawing/2010/main" xmlns="" w="9525">
                     <a:solidFill>
                       <a:srgbClr val="000000"/>
                     </a:solidFill>
@@ -10272,7 +10272,7 @@
               </a:ln>
               <a:extLst>
                 <a:ext uri="{91240B29-F687-4f45-9708-019B960494DF}">
-                  <a14:hiddenLine xmlns="" xmlns:a14="http://schemas.microsoft.com/office/drawing/2010/main" w="9525">
+                  <a14:hiddenLine xmlns:a14="http://schemas.microsoft.com/office/drawing/2010/main" xmlns="" w="9525">
                     <a:solidFill>
                       <a:srgbClr val="000000"/>
                     </a:solidFill>
@@ -10306,7 +10306,7 @@
               </a:ln>
               <a:extLst>
                 <a:ext uri="{91240B29-F687-4f45-9708-019B960494DF}">
-                  <a14:hiddenLine xmlns="" xmlns:a14="http://schemas.microsoft.com/office/drawing/2010/main" w="9525">
+                  <a14:hiddenLine xmlns:a14="http://schemas.microsoft.com/office/drawing/2010/main" xmlns="" w="9525">
                     <a:solidFill>
                       <a:srgbClr val="000000"/>
                     </a:solidFill>
@@ -10371,7 +10371,7 @@
               </a:ln>
               <a:extLst>
                 <a:ext uri="{91240B29-F687-4f45-9708-019B960494DF}">
-                  <a14:hiddenLine xmlns="" xmlns:a14="http://schemas.microsoft.com/office/drawing/2010/main" w="9525">
+                  <a14:hiddenLine xmlns:a14="http://schemas.microsoft.com/office/drawing/2010/main" xmlns="" w="9525">
                     <a:solidFill>
                       <a:srgbClr val="000000"/>
                     </a:solidFill>
@@ -10461,7 +10461,7 @@
               </a:ln>
               <a:extLst>
                 <a:ext uri="{91240B29-F687-4f45-9708-019B960494DF}">
-                  <a14:hiddenLine xmlns="" xmlns:a14="http://schemas.microsoft.com/office/drawing/2010/main" w="9525">
+                  <a14:hiddenLine xmlns:a14="http://schemas.microsoft.com/office/drawing/2010/main" xmlns="" w="9525">
                     <a:solidFill>
                       <a:srgbClr val="000000"/>
                     </a:solidFill>
@@ -10523,7 +10523,7 @@
               </a:ln>
               <a:extLst>
                 <a:ext uri="{91240B29-F687-4f45-9708-019B960494DF}">
-                  <a14:hiddenLine xmlns="" xmlns:a14="http://schemas.microsoft.com/office/drawing/2010/main" w="9525">
+                  <a14:hiddenLine xmlns:a14="http://schemas.microsoft.com/office/drawing/2010/main" xmlns="" w="9525">
                     <a:solidFill>
                       <a:srgbClr val="000000"/>
                     </a:solidFill>
@@ -10613,7 +10613,7 @@
               </a:ln>
               <a:extLst>
                 <a:ext uri="{91240B29-F687-4f45-9708-019B960494DF}">
-                  <a14:hiddenLine xmlns="" xmlns:a14="http://schemas.microsoft.com/office/drawing/2010/main" w="9525">
+                  <a14:hiddenLine xmlns:a14="http://schemas.microsoft.com/office/drawing/2010/main" xmlns="" w="9525">
                     <a:solidFill>
                       <a:srgbClr val="000000"/>
                     </a:solidFill>
@@ -10678,7 +10678,7 @@
               </a:ln>
               <a:extLst>
                 <a:ext uri="{91240B29-F687-4f45-9708-019B960494DF}">
-                  <a14:hiddenLine xmlns="" xmlns:a14="http://schemas.microsoft.com/office/drawing/2010/main" w="9525">
+                  <a14:hiddenLine xmlns:a14="http://schemas.microsoft.com/office/drawing/2010/main" xmlns="" w="9525">
                     <a:solidFill>
                       <a:srgbClr val="000000"/>
                     </a:solidFill>
@@ -10740,7 +10740,7 @@
               </a:ln>
               <a:extLst>
                 <a:ext uri="{91240B29-F687-4f45-9708-019B960494DF}">
-                  <a14:hiddenLine xmlns="" xmlns:a14="http://schemas.microsoft.com/office/drawing/2010/main" w="9525">
+                  <a14:hiddenLine xmlns:a14="http://schemas.microsoft.com/office/drawing/2010/main" xmlns="" w="9525">
                     <a:solidFill>
                       <a:srgbClr val="000000"/>
                     </a:solidFill>
@@ -10830,7 +10830,7 @@
               </a:ln>
               <a:extLst>
                 <a:ext uri="{91240B29-F687-4f45-9708-019B960494DF}">
-                  <a14:hiddenLine xmlns="" xmlns:a14="http://schemas.microsoft.com/office/drawing/2010/main" w="9525">
+                  <a14:hiddenLine xmlns:a14="http://schemas.microsoft.com/office/drawing/2010/main" xmlns="" w="9525">
                     <a:solidFill>
                       <a:srgbClr val="000000"/>
                     </a:solidFill>
@@ -10920,7 +10920,7 @@
               </a:ln>
               <a:extLst>
                 <a:ext uri="{91240B29-F687-4f45-9708-019B960494DF}">
-                  <a14:hiddenLine xmlns="" xmlns:a14="http://schemas.microsoft.com/office/drawing/2010/main" w="9525">
+                  <a14:hiddenLine xmlns:a14="http://schemas.microsoft.com/office/drawing/2010/main" xmlns="" w="9525">
                     <a:solidFill>
                       <a:srgbClr val="000000"/>
                     </a:solidFill>
@@ -10985,7 +10985,7 @@
               </a:ln>
               <a:extLst>
                 <a:ext uri="{91240B29-F687-4f45-9708-019B960494DF}">
-                  <a14:hiddenLine xmlns="" xmlns:a14="http://schemas.microsoft.com/office/drawing/2010/main" w="9525">
+                  <a14:hiddenLine xmlns:a14="http://schemas.microsoft.com/office/drawing/2010/main" xmlns="" w="9525">
                     <a:solidFill>
                       <a:srgbClr val="000000"/>
                     </a:solidFill>
@@ -11105,7 +11105,7 @@
               </a:ln>
               <a:extLst>
                 <a:ext uri="{91240B29-F687-4f45-9708-019B960494DF}">
-                  <a14:hiddenLine xmlns="" xmlns:a14="http://schemas.microsoft.com/office/drawing/2010/main" w="9525">
+                  <a14:hiddenLine xmlns:a14="http://schemas.microsoft.com/office/drawing/2010/main" xmlns="" w="9525">
                     <a:solidFill>
                       <a:srgbClr val="000000"/>
                     </a:solidFill>
@@ -11186,7 +11186,7 @@
               </a:ln>
               <a:extLst>
                 <a:ext uri="{91240B29-F687-4f45-9708-019B960494DF}">
-                  <a14:hiddenLine xmlns="" xmlns:a14="http://schemas.microsoft.com/office/drawing/2010/main" w="9525">
+                  <a14:hiddenLine xmlns:a14="http://schemas.microsoft.com/office/drawing/2010/main" xmlns="" w="9525">
                     <a:solidFill>
                       <a:srgbClr val="000000"/>
                     </a:solidFill>
@@ -11301,7 +11301,7 @@
               </a:ln>
               <a:extLst>
                 <a:ext uri="{91240B29-F687-4f45-9708-019B960494DF}">
-                  <a14:hiddenLine xmlns="" xmlns:a14="http://schemas.microsoft.com/office/drawing/2010/main" w="9525">
+                  <a14:hiddenLine xmlns:a14="http://schemas.microsoft.com/office/drawing/2010/main" xmlns="" w="9525">
                     <a:solidFill>
                       <a:srgbClr val="000000"/>
                     </a:solidFill>
@@ -11391,7 +11391,7 @@
               </a:ln>
               <a:extLst>
                 <a:ext uri="{91240B29-F687-4f45-9708-019B960494DF}">
-                  <a14:hiddenLine xmlns="" xmlns:a14="http://schemas.microsoft.com/office/drawing/2010/main" w="9525">
+                  <a14:hiddenLine xmlns:a14="http://schemas.microsoft.com/office/drawing/2010/main" xmlns="" w="9525">
                     <a:solidFill>
                       <a:srgbClr val="000000"/>
                     </a:solidFill>
@@ -11456,7 +11456,7 @@
               </a:ln>
               <a:extLst>
                 <a:ext uri="{91240B29-F687-4f45-9708-019B960494DF}">
-                  <a14:hiddenLine xmlns="" xmlns:a14="http://schemas.microsoft.com/office/drawing/2010/main" w="9525">
+                  <a14:hiddenLine xmlns:a14="http://schemas.microsoft.com/office/drawing/2010/main" xmlns="" w="9525">
                     <a:solidFill>
                       <a:srgbClr val="000000"/>
                     </a:solidFill>
@@ -11546,7 +11546,7 @@
               </a:ln>
               <a:extLst>
                 <a:ext uri="{91240B29-F687-4f45-9708-019B960494DF}">
-                  <a14:hiddenLine xmlns="" xmlns:a14="http://schemas.microsoft.com/office/drawing/2010/main" w="9525">
+                  <a14:hiddenLine xmlns:a14="http://schemas.microsoft.com/office/drawing/2010/main" xmlns="" w="9525">
                     <a:solidFill>
                       <a:srgbClr val="000000"/>
                     </a:solidFill>
@@ -11614,7 +11614,7 @@
               </a:ln>
               <a:extLst>
                 <a:ext uri="{91240B29-F687-4f45-9708-019B960494DF}">
-                  <a14:hiddenLine xmlns="" xmlns:a14="http://schemas.microsoft.com/office/drawing/2010/main" w="9525">
+                  <a14:hiddenLine xmlns:a14="http://schemas.microsoft.com/office/drawing/2010/main" xmlns="" w="9525">
                     <a:solidFill>
                       <a:srgbClr val="000000"/>
                     </a:solidFill>
@@ -11704,7 +11704,7 @@
               </a:ln>
               <a:extLst>
                 <a:ext uri="{91240B29-F687-4f45-9708-019B960494DF}">
-                  <a14:hiddenLine xmlns="" xmlns:a14="http://schemas.microsoft.com/office/drawing/2010/main" w="9525">
+                  <a14:hiddenLine xmlns:a14="http://schemas.microsoft.com/office/drawing/2010/main" xmlns="" w="9525">
                     <a:solidFill>
                       <a:srgbClr val="000000"/>
                     </a:solidFill>
@@ -11772,7 +11772,7 @@
               </a:ln>
               <a:extLst>
                 <a:ext uri="{91240B29-F687-4f45-9708-019B960494DF}">
-                  <a14:hiddenLine xmlns="" xmlns:a14="http://schemas.microsoft.com/office/drawing/2010/main" w="9525">
+                  <a14:hiddenLine xmlns:a14="http://schemas.microsoft.com/office/drawing/2010/main" xmlns="" w="9525">
                     <a:solidFill>
                       <a:srgbClr val="000000"/>
                     </a:solidFill>
@@ -11862,7 +11862,7 @@
               </a:ln>
               <a:extLst>
                 <a:ext uri="{91240B29-F687-4f45-9708-019B960494DF}">
-                  <a14:hiddenLine xmlns="" xmlns:a14="http://schemas.microsoft.com/office/drawing/2010/main" w="9525">
+                  <a14:hiddenLine xmlns:a14="http://schemas.microsoft.com/office/drawing/2010/main" xmlns="" w="9525">
                     <a:solidFill>
                       <a:srgbClr val="000000"/>
                     </a:solidFill>
@@ -11896,7 +11896,7 @@
               </a:ln>
               <a:extLst>
                 <a:ext uri="{91240B29-F687-4f45-9708-019B960494DF}">
-                  <a14:hiddenLine xmlns="" xmlns:a14="http://schemas.microsoft.com/office/drawing/2010/main" w="9525">
+                  <a14:hiddenLine xmlns:a14="http://schemas.microsoft.com/office/drawing/2010/main" xmlns="" w="9525">
                     <a:solidFill>
                       <a:srgbClr val="000000"/>
                     </a:solidFill>
@@ -13485,20 +13485,15 @@
           <p:nvPr/>
         </p:nvPicPr>
         <p:blipFill>
-          <a:blip r:embed="rId3">
-            <a:extLst>
-              <a:ext uri="{28A0092B-C50C-407E-A947-70E740481C1C}">
-                <a14:useLocalDpi xmlns:a14="http://schemas.microsoft.com/office/drawing/2010/main" val="0"/>
-              </a:ext>
-            </a:extLst>
-          </a:blip>
-          <a:srcRect/>
-          <a:stretch/>
+          <a:blip r:embed="rId3"/>
+          <a:stretch>
+            <a:fillRect/>
+          </a:stretch>
         </p:blipFill>
         <p:spPr>
           <a:xfrm>
-            <a:off x="4106336" y="2565047"/>
-            <a:ext cx="3740696" cy="2785043"/>
+            <a:off x="4106336" y="2584929"/>
+            <a:ext cx="3740696" cy="3261952"/>
           </a:xfrm>
           <a:prstGeom prst="rect">
             <a:avLst/>
@@ -13540,6 +13535,52 @@
           </a:prstGeom>
         </p:spPr>
       </p:pic>
+      <p:sp>
+        <p:nvSpPr>
+          <p:cNvPr id="3" name="Sol 2">
+            <a:extLst>
+              <a:ext uri="{FF2B5EF4-FFF2-40B4-BE49-F238E27FC236}">
+                <a16:creationId xmlns:a16="http://schemas.microsoft.com/office/drawing/2014/main" id="{7C8DB983-E0D5-C1BD-07EE-171FC84D9FF7}"/>
+              </a:ext>
+            </a:extLst>
+          </p:cNvPr>
+          <p:cNvSpPr/>
+          <p:nvPr/>
+        </p:nvSpPr>
+        <p:spPr>
+          <a:xfrm>
+            <a:off x="6946985" y="2251234"/>
+            <a:ext cx="846894" cy="667389"/>
+          </a:xfrm>
+          <a:prstGeom prst="sun">
+            <a:avLst/>
+          </a:prstGeom>
+        </p:spPr>
+        <p:style>
+          <a:lnRef idx="2">
+            <a:schemeClr val="accent1">
+              <a:shade val="15000"/>
+            </a:schemeClr>
+          </a:lnRef>
+          <a:fillRef idx="1">
+            <a:schemeClr val="accent1"/>
+          </a:fillRef>
+          <a:effectRef idx="0">
+            <a:schemeClr val="accent1"/>
+          </a:effectRef>
+          <a:fontRef idx="minor">
+            <a:schemeClr val="lt1"/>
+          </a:fontRef>
+        </p:style>
+        <p:txBody>
+          <a:bodyPr rtlCol="0" anchor="ctr"/>
+          <a:lstStyle/>
+          <a:p>
+            <a:pPr algn="ctr"/>
+            <a:endParaRPr lang="es-ES"/>
+          </a:p>
+        </p:txBody>
+      </p:sp>
     </p:spTree>
     <p:extLst>
       <p:ext uri="{BB962C8B-B14F-4D97-AF65-F5344CB8AC3E}">
@@ -13660,20 +13701,15 @@
           <p:nvPr/>
         </p:nvPicPr>
         <p:blipFill>
-          <a:blip r:embed="rId3">
-            <a:extLst>
-              <a:ext uri="{28A0092B-C50C-407E-A947-70E740481C1C}">
-                <a14:useLocalDpi xmlns:a14="http://schemas.microsoft.com/office/drawing/2010/main" val="0"/>
-              </a:ext>
-            </a:extLst>
-          </a:blip>
-          <a:srcRect/>
-          <a:stretch/>
+          <a:blip r:embed="rId3"/>
+          <a:stretch>
+            <a:fillRect/>
+          </a:stretch>
         </p:blipFill>
         <p:spPr>
           <a:xfrm>
             <a:off x="6096000" y="2505317"/>
-            <a:ext cx="4313009" cy="2257498"/>
+            <a:ext cx="4703122" cy="2257498"/>
           </a:xfrm>
           <a:prstGeom prst="rect">
             <a:avLst/>
@@ -13715,6 +13751,52 @@
           </a:prstGeom>
         </p:spPr>
       </p:pic>
+      <p:sp>
+        <p:nvSpPr>
+          <p:cNvPr id="3" name="Sol 2">
+            <a:extLst>
+              <a:ext uri="{FF2B5EF4-FFF2-40B4-BE49-F238E27FC236}">
+                <a16:creationId xmlns:a16="http://schemas.microsoft.com/office/drawing/2014/main" id="{E51E1D86-E9F4-1121-D7E5-842187A00DAC}"/>
+              </a:ext>
+            </a:extLst>
+          </p:cNvPr>
+          <p:cNvSpPr/>
+          <p:nvPr/>
+        </p:nvSpPr>
+        <p:spPr>
+          <a:xfrm>
+            <a:off x="10115967" y="2139598"/>
+            <a:ext cx="846894" cy="667389"/>
+          </a:xfrm>
+          <a:prstGeom prst="sun">
+            <a:avLst/>
+          </a:prstGeom>
+        </p:spPr>
+        <p:style>
+          <a:lnRef idx="2">
+            <a:schemeClr val="accent1">
+              <a:shade val="15000"/>
+            </a:schemeClr>
+          </a:lnRef>
+          <a:fillRef idx="1">
+            <a:schemeClr val="accent1"/>
+          </a:fillRef>
+          <a:effectRef idx="0">
+            <a:schemeClr val="accent1"/>
+          </a:effectRef>
+          <a:fontRef idx="minor">
+            <a:schemeClr val="lt1"/>
+          </a:fontRef>
+        </p:style>
+        <p:txBody>
+          <a:bodyPr rtlCol="0" anchor="ctr"/>
+          <a:lstStyle/>
+          <a:p>
+            <a:pPr algn="ctr"/>
+            <a:endParaRPr lang="es-ES"/>
+          </a:p>
+        </p:txBody>
+      </p:sp>
     </p:spTree>
     <p:extLst>
       <p:ext uri="{BB962C8B-B14F-4D97-AF65-F5344CB8AC3E}">
@@ -14513,23 +14595,6 @@
 </file>
 
 <file path=customXml/item1.xml><?xml version="1.0" encoding="utf-8"?>
-<p:properties xmlns:p="http://schemas.microsoft.com/office/2006/metadata/properties" xmlns:xsi="http://www.w3.org/2001/XMLSchema-instance" xmlns:pc="http://schemas.microsoft.com/office/infopath/2007/PartnerControls">
-  <documentManagement>
-    <_activity xmlns="c846ee4d-cd50-40aa-8c53-0404ef98127e" xsi:nil="true"/>
-  </documentManagement>
-</p:properties>
-</file>
-
-<file path=customXml/item2.xml><?xml version="1.0" encoding="utf-8"?>
-<?mso-contentType ?>
-<FormTemplates xmlns="http://schemas.microsoft.com/sharepoint/v3/contenttype/forms">
-  <Display>DocumentLibraryForm</Display>
-  <Edit>DocumentLibraryForm</Edit>
-  <New>DocumentLibraryForm</New>
-</FormTemplates>
-</file>
-
-<file path=customXml/item3.xml><?xml version="1.0" encoding="utf-8"?>
 <ct:contentTypeSchema xmlns:ct="http://schemas.microsoft.com/office/2006/metadata/contentType" xmlns:ma="http://schemas.microsoft.com/office/2006/metadata/properties/metaAttributes" ct:_="" ma:_="" ma:contentTypeName="Documento" ma:contentTypeID="0x010100B311B9E66B74A74F85FCA1A5354868B3" ma:contentTypeVersion="14" ma:contentTypeDescription="Crear nuevo documento." ma:contentTypeScope="" ma:versionID="a4cb7d73271d44f68eb8b86d9b73e107">
   <xsd:schema xmlns:xsd="http://www.w3.org/2001/XMLSchema" xmlns:xs="http://www.w3.org/2001/XMLSchema" xmlns:p="http://schemas.microsoft.com/office/2006/metadata/properties" xmlns:ns3="c846ee4d-cd50-40aa-8c53-0404ef98127e" xmlns:ns4="8b6f5009-b8e6-4fa2-b519-a242ae5c6222" targetNamespace="http://schemas.microsoft.com/office/2006/metadata/properties" ma:root="true" ma:fieldsID="d063454d8f6584d411c4cc7c42ccac14" ns3:_="" ns4:_="">
     <xsd:import namespace="c846ee4d-cd50-40aa-8c53-0404ef98127e"/>
@@ -14756,32 +14821,24 @@
 </ct:contentTypeSchema>
 </file>
 
-<file path=customXml/itemProps1.xml><?xml version="1.0" encoding="utf-8"?>
-<ds:datastoreItem xmlns:ds="http://schemas.openxmlformats.org/officeDocument/2006/customXml" ds:itemID="{DA282525-D9ED-4CA2-BEE9-F86F16EB38CD}">
-  <ds:schemaRefs>
-    <ds:schemaRef ds:uri="http://www.w3.org/XML/1998/namespace"/>
-    <ds:schemaRef ds:uri="http://purl.org/dc/elements/1.1/"/>
-    <ds:schemaRef ds:uri="http://purl.org/dc/dcmitype/"/>
-    <ds:schemaRef ds:uri="http://schemas.microsoft.com/office/infopath/2007/PartnerControls"/>
-    <ds:schemaRef ds:uri="http://schemas.microsoft.com/office/2006/documentManagement/types"/>
-    <ds:schemaRef ds:uri="c846ee4d-cd50-40aa-8c53-0404ef98127e"/>
-    <ds:schemaRef ds:uri="http://purl.org/dc/terms/"/>
-    <ds:schemaRef ds:uri="http://schemas.openxmlformats.org/package/2006/metadata/core-properties"/>
-    <ds:schemaRef ds:uri="8b6f5009-b8e6-4fa2-b519-a242ae5c6222"/>
-    <ds:schemaRef ds:uri="http://schemas.microsoft.com/office/2006/metadata/properties"/>
-  </ds:schemaRefs>
-</ds:datastoreItem>
+<file path=customXml/item2.xml><?xml version="1.0" encoding="utf-8"?>
+<?mso-contentType ?>
+<FormTemplates xmlns="http://schemas.microsoft.com/sharepoint/v3/contenttype/forms">
+  <Display>DocumentLibraryForm</Display>
+  <Edit>DocumentLibraryForm</Edit>
+  <New>DocumentLibraryForm</New>
+</FormTemplates>
 </file>
 
-<file path=customXml/itemProps2.xml><?xml version="1.0" encoding="utf-8"?>
-<ds:datastoreItem xmlns:ds="http://schemas.openxmlformats.org/officeDocument/2006/customXml" ds:itemID="{9F400E30-8A4B-463E-ABDB-0E3F7E97BCA0}">
-  <ds:schemaRefs>
-    <ds:schemaRef ds:uri="http://schemas.microsoft.com/sharepoint/v3/contenttype/forms"/>
-  </ds:schemaRefs>
-</ds:datastoreItem>
+<file path=customXml/item3.xml><?xml version="1.0" encoding="utf-8"?>
+<p:properties xmlns:p="http://schemas.microsoft.com/office/2006/metadata/properties" xmlns:xsi="http://www.w3.org/2001/XMLSchema-instance" xmlns:pc="http://schemas.microsoft.com/office/infopath/2007/PartnerControls">
+  <documentManagement>
+    <_activity xmlns="c846ee4d-cd50-40aa-8c53-0404ef98127e" xsi:nil="true"/>
+  </documentManagement>
+</p:properties>
 </file>
 
-<file path=customXml/itemProps3.xml><?xml version="1.0" encoding="utf-8"?>
+<file path=customXml/itemProps1.xml><?xml version="1.0" encoding="utf-8"?>
 <ds:datastoreItem xmlns:ds="http://schemas.openxmlformats.org/officeDocument/2006/customXml" ds:itemID="{F358E5F1-235D-47B5-A2AB-525184B8E8D3}">
   <ds:schemaRefs>
     <ds:schemaRef ds:uri="http://schemas.microsoft.com/office/2006/metadata/contentType"/>
@@ -14798,4 +14855,29 @@
     <ds:schemaRef ds:uri="http://schemas.microsoft.com/internal/obd"/>
   </ds:schemaRefs>
 </ds:datastoreItem>
+</file>
+
+<file path=customXml/itemProps2.xml><?xml version="1.0" encoding="utf-8"?>
+<ds:datastoreItem xmlns:ds="http://schemas.openxmlformats.org/officeDocument/2006/customXml" ds:itemID="{9F400E30-8A4B-463E-ABDB-0E3F7E97BCA0}">
+  <ds:schemaRefs>
+    <ds:schemaRef ds:uri="http://schemas.microsoft.com/sharepoint/v3/contenttype/forms"/>
+  </ds:schemaRefs>
+</ds:datastoreItem>
+</file>
+
+<file path=customXml/itemProps3.xml><?xml version="1.0" encoding="utf-8"?>
+<ds:datastoreItem xmlns:ds="http://schemas.openxmlformats.org/officeDocument/2006/customXml" ds:itemID="{DA282525-D9ED-4CA2-BEE9-F86F16EB38CD}">
+  <ds:schemaRefs>
+    <ds:schemaRef ds:uri="http://www.w3.org/XML/1998/namespace"/>
+    <ds:schemaRef ds:uri="http://purl.org/dc/elements/1.1/"/>
+    <ds:schemaRef ds:uri="http://purl.org/dc/dcmitype/"/>
+    <ds:schemaRef ds:uri="http://schemas.microsoft.com/office/infopath/2007/PartnerControls"/>
+    <ds:schemaRef ds:uri="http://schemas.microsoft.com/office/2006/documentManagement/types"/>
+    <ds:schemaRef ds:uri="c846ee4d-cd50-40aa-8c53-0404ef98127e"/>
+    <ds:schemaRef ds:uri="http://purl.org/dc/terms/"/>
+    <ds:schemaRef ds:uri="http://schemas.openxmlformats.org/package/2006/metadata/core-properties"/>
+    <ds:schemaRef ds:uri="8b6f5009-b8e6-4fa2-b519-a242ae5c6222"/>
+    <ds:schemaRef ds:uri="http://schemas.microsoft.com/office/2006/metadata/properties"/>
+  </ds:schemaRefs>
+</ds:datastoreItem>
 </file>
</xml_diff>

<commit_message>
volver a meter la presentacion de manel
</commit_message>
<xml_diff>
--- a/RETO 2 Envío de datos.pptx
+++ b/RETO 2 Envío de datos.pptx
@@ -4401,7 +4401,7 @@
           <a:p>
             <a:fld id="{7DA38F49-B3E2-4BF0-BEC7-C30D34ABBB8D}" type="datetime1">
               <a:rPr lang="en-US" smtClean="0"/>
-              <a:t>3/5/2025</a:t>
+              <a:t>3/6/2025</a:t>
             </a:fld>
             <a:endParaRPr lang="en-US"/>
           </a:p>
@@ -4669,7 +4669,7 @@
           <a:p>
             <a:fld id="{7DA38F49-B3E2-4BF0-BEC7-C30D34ABBB8D}" type="datetime1">
               <a:rPr lang="en-US" smtClean="0"/>
-              <a:t>3/5/2025</a:t>
+              <a:t>3/6/2025</a:t>
             </a:fld>
             <a:endParaRPr lang="en-US"/>
           </a:p>
@@ -4866,7 +4866,7 @@
           <a:p>
             <a:fld id="{7DA38F49-B3E2-4BF0-BEC7-C30D34ABBB8D}" type="datetime1">
               <a:rPr lang="en-US" smtClean="0"/>
-              <a:t>3/5/2025</a:t>
+              <a:t>3/6/2025</a:t>
             </a:fld>
             <a:endParaRPr lang="en-US"/>
           </a:p>
@@ -5130,7 +5130,7 @@
           <a:p>
             <a:fld id="{7DA38F49-B3E2-4BF0-BEC7-C30D34ABBB8D}" type="datetime1">
               <a:rPr lang="en-US" smtClean="0"/>
-              <a:t>3/5/2025</a:t>
+              <a:t>3/6/2025</a:t>
             </a:fld>
             <a:endParaRPr lang="en-US"/>
           </a:p>
@@ -5565,7 +5565,7 @@
           <a:p>
             <a:fld id="{7DA38F49-B3E2-4BF0-BEC7-C30D34ABBB8D}" type="datetime1">
               <a:rPr lang="en-US" smtClean="0"/>
-              <a:t>3/5/2025</a:t>
+              <a:t>3/6/2025</a:t>
             </a:fld>
             <a:endParaRPr lang="en-US"/>
           </a:p>
@@ -6112,7 +6112,7 @@
           <a:p>
             <a:fld id="{7DA38F49-B3E2-4BF0-BEC7-C30D34ABBB8D}" type="datetime1">
               <a:rPr lang="en-US" smtClean="0"/>
-              <a:t>3/5/2025</a:t>
+              <a:t>3/6/2025</a:t>
             </a:fld>
             <a:endParaRPr lang="en-US"/>
           </a:p>
@@ -6833,7 +6833,7 @@
           <a:p>
             <a:fld id="{7DA38F49-B3E2-4BF0-BEC7-C30D34ABBB8D}" type="datetime1">
               <a:rPr lang="en-US" smtClean="0"/>
-              <a:t>3/5/2025</a:t>
+              <a:t>3/6/2025</a:t>
             </a:fld>
             <a:endParaRPr lang="en-US"/>
           </a:p>
@@ -7004,7 +7004,7 @@
           <a:p>
             <a:fld id="{7DA38F49-B3E2-4BF0-BEC7-C30D34ABBB8D}" type="datetime1">
               <a:rPr lang="en-US" smtClean="0"/>
-              <a:t>3/5/2025</a:t>
+              <a:t>3/6/2025</a:t>
             </a:fld>
             <a:endParaRPr lang="en-US"/>
           </a:p>
@@ -7185,7 +7185,7 @@
           <a:p>
             <a:fld id="{7DA38F49-B3E2-4BF0-BEC7-C30D34ABBB8D}" type="datetime1">
               <a:rPr lang="en-US" smtClean="0"/>
-              <a:t>3/5/2025</a:t>
+              <a:t>3/6/2025</a:t>
             </a:fld>
             <a:endParaRPr lang="en-US"/>
           </a:p>
@@ -7356,7 +7356,7 @@
           <a:p>
             <a:fld id="{7DA38F49-B3E2-4BF0-BEC7-C30D34ABBB8D}" type="datetime1">
               <a:rPr lang="en-US" smtClean="0"/>
-              <a:t>3/5/2025</a:t>
+              <a:t>3/6/2025</a:t>
             </a:fld>
             <a:endParaRPr lang="en-US"/>
           </a:p>
@@ -7607,7 +7607,7 @@
           <a:p>
             <a:fld id="{7DA38F49-B3E2-4BF0-BEC7-C30D34ABBB8D}" type="datetime1">
               <a:rPr lang="en-US" smtClean="0"/>
-              <a:t>3/5/2025</a:t>
+              <a:t>3/6/2025</a:t>
             </a:fld>
             <a:endParaRPr lang="en-US"/>
           </a:p>
@@ -7840,7 +7840,7 @@
           <a:p>
             <a:fld id="{7DA38F49-B3E2-4BF0-BEC7-C30D34ABBB8D}" type="datetime1">
               <a:rPr lang="en-US" smtClean="0"/>
-              <a:t>3/5/2025</a:t>
+              <a:t>3/6/2025</a:t>
             </a:fld>
             <a:endParaRPr lang="en-US"/>
           </a:p>
@@ -8222,7 +8222,7 @@
           <a:p>
             <a:fld id="{7DA38F49-B3E2-4BF0-BEC7-C30D34ABBB8D}" type="datetime1">
               <a:rPr lang="en-US" smtClean="0"/>
-              <a:t>3/5/2025</a:t>
+              <a:t>3/6/2025</a:t>
             </a:fld>
             <a:endParaRPr lang="en-US"/>
           </a:p>
@@ -8341,7 +8341,7 @@
           <a:p>
             <a:fld id="{7DA38F49-B3E2-4BF0-BEC7-C30D34ABBB8D}" type="datetime1">
               <a:rPr lang="en-US" smtClean="0"/>
-              <a:t>3/5/2025</a:t>
+              <a:t>3/6/2025</a:t>
             </a:fld>
             <a:endParaRPr lang="en-US"/>
           </a:p>
@@ -8437,7 +8437,7 @@
           <a:p>
             <a:fld id="{7DA38F49-B3E2-4BF0-BEC7-C30D34ABBB8D}" type="datetime1">
               <a:rPr lang="en-US" smtClean="0"/>
-              <a:t>3/5/2025</a:t>
+              <a:t>3/6/2025</a:t>
             </a:fld>
             <a:endParaRPr lang="en-US"/>
           </a:p>
@@ -8687,7 +8687,7 @@
           <a:p>
             <a:fld id="{7DA38F49-B3E2-4BF0-BEC7-C30D34ABBB8D}" type="datetime1">
               <a:rPr lang="en-US" smtClean="0"/>
-              <a:t>3/5/2025</a:t>
+              <a:t>3/6/2025</a:t>
             </a:fld>
             <a:endParaRPr lang="en-US"/>
           </a:p>
@@ -8968,7 +8968,7 @@
           <a:p>
             <a:fld id="{7DA38F49-B3E2-4BF0-BEC7-C30D34ABBB8D}" type="datetime1">
               <a:rPr lang="en-US" smtClean="0"/>
-              <a:t>3/5/2025</a:t>
+              <a:t>3/6/2025</a:t>
             </a:fld>
             <a:endParaRPr lang="en-US"/>
           </a:p>
@@ -12036,7 +12036,7 @@
           <a:p>
             <a:fld id="{7DA38F49-B3E2-4BF0-BEC7-C30D34ABBB8D}" type="datetime1">
               <a:rPr lang="en-US" smtClean="0"/>
-              <a:t>3/5/2025</a:t>
+              <a:t>3/6/2025</a:t>
             </a:fld>
             <a:endParaRPr lang="en-US"/>
           </a:p>
@@ -13485,15 +13485,20 @@
           <p:nvPr/>
         </p:nvPicPr>
         <p:blipFill>
-          <a:blip r:embed="rId3"/>
-          <a:stretch>
-            <a:fillRect/>
-          </a:stretch>
+          <a:blip r:embed="rId3">
+            <a:extLst>
+              <a:ext uri="{28A0092B-C50C-407E-A947-70E740481C1C}">
+                <a14:useLocalDpi xmlns:a14="http://schemas.microsoft.com/office/drawing/2010/main" val="0"/>
+              </a:ext>
+            </a:extLst>
+          </a:blip>
+          <a:srcRect/>
+          <a:stretch/>
         </p:blipFill>
         <p:spPr>
           <a:xfrm>
-            <a:off x="4106336" y="2584929"/>
-            <a:ext cx="3740696" cy="3261952"/>
+            <a:off x="4106336" y="2565047"/>
+            <a:ext cx="3740696" cy="2785043"/>
           </a:xfrm>
           <a:prstGeom prst="rect">
             <a:avLst/>
@@ -13535,52 +13540,6 @@
           </a:prstGeom>
         </p:spPr>
       </p:pic>
-      <p:sp>
-        <p:nvSpPr>
-          <p:cNvPr id="3" name="Sol 2">
-            <a:extLst>
-              <a:ext uri="{FF2B5EF4-FFF2-40B4-BE49-F238E27FC236}">
-                <a16:creationId xmlns:a16="http://schemas.microsoft.com/office/drawing/2014/main" id="{7C8DB983-E0D5-C1BD-07EE-171FC84D9FF7}"/>
-              </a:ext>
-            </a:extLst>
-          </p:cNvPr>
-          <p:cNvSpPr/>
-          <p:nvPr/>
-        </p:nvSpPr>
-        <p:spPr>
-          <a:xfrm>
-            <a:off x="6946985" y="2251234"/>
-            <a:ext cx="846894" cy="667389"/>
-          </a:xfrm>
-          <a:prstGeom prst="sun">
-            <a:avLst/>
-          </a:prstGeom>
-        </p:spPr>
-        <p:style>
-          <a:lnRef idx="2">
-            <a:schemeClr val="accent1">
-              <a:shade val="15000"/>
-            </a:schemeClr>
-          </a:lnRef>
-          <a:fillRef idx="1">
-            <a:schemeClr val="accent1"/>
-          </a:fillRef>
-          <a:effectRef idx="0">
-            <a:schemeClr val="accent1"/>
-          </a:effectRef>
-          <a:fontRef idx="minor">
-            <a:schemeClr val="lt1"/>
-          </a:fontRef>
-        </p:style>
-        <p:txBody>
-          <a:bodyPr rtlCol="0" anchor="ctr"/>
-          <a:lstStyle/>
-          <a:p>
-            <a:pPr algn="ctr"/>
-            <a:endParaRPr lang="es-ES"/>
-          </a:p>
-        </p:txBody>
-      </p:sp>
     </p:spTree>
     <p:extLst>
       <p:ext uri="{BB962C8B-B14F-4D97-AF65-F5344CB8AC3E}">
@@ -13701,15 +13660,20 @@
           <p:nvPr/>
         </p:nvPicPr>
         <p:blipFill>
-          <a:blip r:embed="rId3"/>
-          <a:stretch>
-            <a:fillRect/>
-          </a:stretch>
+          <a:blip r:embed="rId3">
+            <a:extLst>
+              <a:ext uri="{28A0092B-C50C-407E-A947-70E740481C1C}">
+                <a14:useLocalDpi xmlns:a14="http://schemas.microsoft.com/office/drawing/2010/main" val="0"/>
+              </a:ext>
+            </a:extLst>
+          </a:blip>
+          <a:srcRect/>
+          <a:stretch/>
         </p:blipFill>
         <p:spPr>
           <a:xfrm>
             <a:off x="6096000" y="2505317"/>
-            <a:ext cx="4703122" cy="2257498"/>
+            <a:ext cx="4313009" cy="2257498"/>
           </a:xfrm>
           <a:prstGeom prst="rect">
             <a:avLst/>
@@ -13751,52 +13715,6 @@
           </a:prstGeom>
         </p:spPr>
       </p:pic>
-      <p:sp>
-        <p:nvSpPr>
-          <p:cNvPr id="3" name="Sol 2">
-            <a:extLst>
-              <a:ext uri="{FF2B5EF4-FFF2-40B4-BE49-F238E27FC236}">
-                <a16:creationId xmlns:a16="http://schemas.microsoft.com/office/drawing/2014/main" id="{E51E1D86-E9F4-1121-D7E5-842187A00DAC}"/>
-              </a:ext>
-            </a:extLst>
-          </p:cNvPr>
-          <p:cNvSpPr/>
-          <p:nvPr/>
-        </p:nvSpPr>
-        <p:spPr>
-          <a:xfrm>
-            <a:off x="10115967" y="2139598"/>
-            <a:ext cx="846894" cy="667389"/>
-          </a:xfrm>
-          <a:prstGeom prst="sun">
-            <a:avLst/>
-          </a:prstGeom>
-        </p:spPr>
-        <p:style>
-          <a:lnRef idx="2">
-            <a:schemeClr val="accent1">
-              <a:shade val="15000"/>
-            </a:schemeClr>
-          </a:lnRef>
-          <a:fillRef idx="1">
-            <a:schemeClr val="accent1"/>
-          </a:fillRef>
-          <a:effectRef idx="0">
-            <a:schemeClr val="accent1"/>
-          </a:effectRef>
-          <a:fontRef idx="minor">
-            <a:schemeClr val="lt1"/>
-          </a:fontRef>
-        </p:style>
-        <p:txBody>
-          <a:bodyPr rtlCol="0" anchor="ctr"/>
-          <a:lstStyle/>
-          <a:p>
-            <a:pPr algn="ctr"/>
-            <a:endParaRPr lang="es-ES"/>
-          </a:p>
-        </p:txBody>
-      </p:sp>
     </p:spTree>
     <p:extLst>
       <p:ext uri="{BB962C8B-B14F-4D97-AF65-F5344CB8AC3E}">
@@ -14595,6 +14513,14 @@
 </file>
 
 <file path=customXml/item1.xml><?xml version="1.0" encoding="utf-8"?>
+<p:properties xmlns:p="http://schemas.microsoft.com/office/2006/metadata/properties" xmlns:xsi="http://www.w3.org/2001/XMLSchema-instance" xmlns:pc="http://schemas.microsoft.com/office/infopath/2007/PartnerControls">
+  <documentManagement>
+    <_activity xmlns="c846ee4d-cd50-40aa-8c53-0404ef98127e" xsi:nil="true"/>
+  </documentManagement>
+</p:properties>
+</file>
+
+<file path=customXml/item2.xml><?xml version="1.0" encoding="utf-8"?>
 <ct:contentTypeSchema xmlns:ct="http://schemas.microsoft.com/office/2006/metadata/contentType" xmlns:ma="http://schemas.microsoft.com/office/2006/metadata/properties/metaAttributes" ct:_="" ma:_="" ma:contentTypeName="Documento" ma:contentTypeID="0x010100B311B9E66B74A74F85FCA1A5354868B3" ma:contentTypeVersion="14" ma:contentTypeDescription="Crear nuevo documento." ma:contentTypeScope="" ma:versionID="a4cb7d73271d44f68eb8b86d9b73e107">
   <xsd:schema xmlns:xsd="http://www.w3.org/2001/XMLSchema" xmlns:xs="http://www.w3.org/2001/XMLSchema" xmlns:p="http://schemas.microsoft.com/office/2006/metadata/properties" xmlns:ns3="c846ee4d-cd50-40aa-8c53-0404ef98127e" xmlns:ns4="8b6f5009-b8e6-4fa2-b519-a242ae5c6222" targetNamespace="http://schemas.microsoft.com/office/2006/metadata/properties" ma:root="true" ma:fieldsID="d063454d8f6584d411c4cc7c42ccac14" ns3:_="" ns4:_="">
     <xsd:import namespace="c846ee4d-cd50-40aa-8c53-0404ef98127e"/>
@@ -14821,7 +14747,7 @@
 </ct:contentTypeSchema>
 </file>
 
-<file path=customXml/item2.xml><?xml version="1.0" encoding="utf-8"?>
+<file path=customXml/item3.xml><?xml version="1.0" encoding="utf-8"?>
 <?mso-contentType ?>
 <FormTemplates xmlns="http://schemas.microsoft.com/sharepoint/v3/contenttype/forms">
   <Display>DocumentLibraryForm</Display>
@@ -14830,15 +14756,24 @@
 </FormTemplates>
 </file>
 
-<file path=customXml/item3.xml><?xml version="1.0" encoding="utf-8"?>
-<p:properties xmlns:p="http://schemas.microsoft.com/office/2006/metadata/properties" xmlns:xsi="http://www.w3.org/2001/XMLSchema-instance" xmlns:pc="http://schemas.microsoft.com/office/infopath/2007/PartnerControls">
-  <documentManagement>
-    <_activity xmlns="c846ee4d-cd50-40aa-8c53-0404ef98127e" xsi:nil="true"/>
-  </documentManagement>
-</p:properties>
+<file path=customXml/itemProps1.xml><?xml version="1.0" encoding="utf-8"?>
+<ds:datastoreItem xmlns:ds="http://schemas.openxmlformats.org/officeDocument/2006/customXml" ds:itemID="{DA282525-D9ED-4CA2-BEE9-F86F16EB38CD}">
+  <ds:schemaRefs>
+    <ds:schemaRef ds:uri="http://www.w3.org/XML/1998/namespace"/>
+    <ds:schemaRef ds:uri="http://purl.org/dc/elements/1.1/"/>
+    <ds:schemaRef ds:uri="http://purl.org/dc/dcmitype/"/>
+    <ds:schemaRef ds:uri="http://schemas.microsoft.com/office/infopath/2007/PartnerControls"/>
+    <ds:schemaRef ds:uri="http://schemas.microsoft.com/office/2006/documentManagement/types"/>
+    <ds:schemaRef ds:uri="c846ee4d-cd50-40aa-8c53-0404ef98127e"/>
+    <ds:schemaRef ds:uri="http://purl.org/dc/terms/"/>
+    <ds:schemaRef ds:uri="http://schemas.openxmlformats.org/package/2006/metadata/core-properties"/>
+    <ds:schemaRef ds:uri="8b6f5009-b8e6-4fa2-b519-a242ae5c6222"/>
+    <ds:schemaRef ds:uri="http://schemas.microsoft.com/office/2006/metadata/properties"/>
+  </ds:schemaRefs>
+</ds:datastoreItem>
 </file>
 
-<file path=customXml/itemProps1.xml><?xml version="1.0" encoding="utf-8"?>
+<file path=customXml/itemProps2.xml><?xml version="1.0" encoding="utf-8"?>
 <ds:datastoreItem xmlns:ds="http://schemas.openxmlformats.org/officeDocument/2006/customXml" ds:itemID="{F358E5F1-235D-47B5-A2AB-525184B8E8D3}">
   <ds:schemaRefs>
     <ds:schemaRef ds:uri="http://schemas.microsoft.com/office/2006/metadata/contentType"/>
@@ -14857,27 +14792,10 @@
 </ds:datastoreItem>
 </file>
 
-<file path=customXml/itemProps2.xml><?xml version="1.0" encoding="utf-8"?>
+<file path=customXml/itemProps3.xml><?xml version="1.0" encoding="utf-8"?>
 <ds:datastoreItem xmlns:ds="http://schemas.openxmlformats.org/officeDocument/2006/customXml" ds:itemID="{9F400E30-8A4B-463E-ABDB-0E3F7E97BCA0}">
   <ds:schemaRefs>
     <ds:schemaRef ds:uri="http://schemas.microsoft.com/sharepoint/v3/contenttype/forms"/>
   </ds:schemaRefs>
 </ds:datastoreItem>
-</file>
-
-<file path=customXml/itemProps3.xml><?xml version="1.0" encoding="utf-8"?>
-<ds:datastoreItem xmlns:ds="http://schemas.openxmlformats.org/officeDocument/2006/customXml" ds:itemID="{DA282525-D9ED-4CA2-BEE9-F86F16EB38CD}">
-  <ds:schemaRefs>
-    <ds:schemaRef ds:uri="http://www.w3.org/XML/1998/namespace"/>
-    <ds:schemaRef ds:uri="http://purl.org/dc/elements/1.1/"/>
-    <ds:schemaRef ds:uri="http://purl.org/dc/dcmitype/"/>
-    <ds:schemaRef ds:uri="http://schemas.microsoft.com/office/infopath/2007/PartnerControls"/>
-    <ds:schemaRef ds:uri="http://schemas.microsoft.com/office/2006/documentManagement/types"/>
-    <ds:schemaRef ds:uri="c846ee4d-cd50-40aa-8c53-0404ef98127e"/>
-    <ds:schemaRef ds:uri="http://purl.org/dc/terms/"/>
-    <ds:schemaRef ds:uri="http://schemas.openxmlformats.org/package/2006/metadata/core-properties"/>
-    <ds:schemaRef ds:uri="8b6f5009-b8e6-4fa2-b519-a242ae5c6222"/>
-    <ds:schemaRef ds:uri="http://schemas.microsoft.com/office/2006/metadata/properties"/>
-  </ds:schemaRefs>
-</ds:datastoreItem>
 </file>
</xml_diff>

<commit_message>
hacer bien el power point
</commit_message>
<xml_diff>
--- a/RETO 2 Envío de datos.pptx
+++ b/RETO 2 Envío de datos.pptx
@@ -11,8 +11,12 @@
     <p:sldId id="259" r:id="rId8"/>
     <p:sldId id="260" r:id="rId9"/>
     <p:sldId id="261" r:id="rId10"/>
-    <p:sldId id="262" r:id="rId11"/>
-    <p:sldId id="264" r:id="rId12"/>
+    <p:sldId id="265" r:id="rId11"/>
+    <p:sldId id="262" r:id="rId12"/>
+    <p:sldId id="264" r:id="rId13"/>
+    <p:sldId id="266" r:id="rId14"/>
+    <p:sldId id="267" r:id="rId15"/>
+    <p:sldId id="268" r:id="rId16"/>
   </p:sldIdLst>
   <p:sldSz cx="12192000" cy="6858000"/>
   <p:notesSz cx="6858000" cy="9144000"/>
@@ -176,7 +180,7 @@
           <a:noFill/>
           <a:extLst>
             <a:ext uri="{909E8E84-426E-40dd-AFC4-6F175D3DCCD1}">
-              <a14:hiddenFill xmlns:a14="http://schemas.microsoft.com/office/drawing/2010/main" xmlns="">
+              <a14:hiddenFill xmlns="" xmlns:a14="http://schemas.microsoft.com/office/drawing/2010/main">
                 <a:solidFill>
                   <a:srgbClr val="FFFFFF"/>
                 </a:solidFill>
@@ -235,7 +239,7 @@
             </a:ln>
             <a:extLst>
               <a:ext uri="{91240B29-F687-4f45-9708-019B960494DF}">
-                <a14:hiddenLine xmlns:a14="http://schemas.microsoft.com/office/drawing/2010/main" xmlns="" w="9525">
+                <a14:hiddenLine xmlns="" xmlns:a14="http://schemas.microsoft.com/office/drawing/2010/main" w="9525">
                   <a:solidFill>
                     <a:srgbClr val="000000"/>
                   </a:solidFill>
@@ -325,7 +329,7 @@
             </a:ln>
             <a:extLst>
               <a:ext uri="{91240B29-F687-4f45-9708-019B960494DF}">
-                <a14:hiddenLine xmlns:a14="http://schemas.microsoft.com/office/drawing/2010/main" xmlns="" w="9525">
+                <a14:hiddenLine xmlns="" xmlns:a14="http://schemas.microsoft.com/office/drawing/2010/main" w="9525">
                   <a:solidFill>
                     <a:srgbClr val="000000"/>
                   </a:solidFill>
@@ -415,7 +419,7 @@
             </a:ln>
             <a:extLst>
               <a:ext uri="{91240B29-F687-4f45-9708-019B960494DF}">
-                <a14:hiddenLine xmlns:a14="http://schemas.microsoft.com/office/drawing/2010/main" xmlns="" w="9525">
+                <a14:hiddenLine xmlns="" xmlns:a14="http://schemas.microsoft.com/office/drawing/2010/main" w="9525">
                   <a:solidFill>
                     <a:srgbClr val="000000"/>
                   </a:solidFill>
@@ -449,7 +453,7 @@
             </a:ln>
             <a:extLst>
               <a:ext uri="{91240B29-F687-4f45-9708-019B960494DF}">
-                <a14:hiddenLine xmlns:a14="http://schemas.microsoft.com/office/drawing/2010/main" xmlns="" w="9525">
+                <a14:hiddenLine xmlns="" xmlns:a14="http://schemas.microsoft.com/office/drawing/2010/main" w="9525">
                   <a:solidFill>
                     <a:srgbClr val="000000"/>
                   </a:solidFill>
@@ -539,7 +543,7 @@
             </a:ln>
             <a:extLst>
               <a:ext uri="{91240B29-F687-4f45-9708-019B960494DF}">
-                <a14:hiddenLine xmlns:a14="http://schemas.microsoft.com/office/drawing/2010/main" xmlns="" w="9525">
+                <a14:hiddenLine xmlns="" xmlns:a14="http://schemas.microsoft.com/office/drawing/2010/main" w="9525">
                   <a:solidFill>
                     <a:srgbClr val="000000"/>
                   </a:solidFill>
@@ -601,7 +605,7 @@
             </a:ln>
             <a:extLst>
               <a:ext uri="{91240B29-F687-4f45-9708-019B960494DF}">
-                <a14:hiddenLine xmlns:a14="http://schemas.microsoft.com/office/drawing/2010/main" xmlns="" w="9525">
+                <a14:hiddenLine xmlns="" xmlns:a14="http://schemas.microsoft.com/office/drawing/2010/main" w="9525">
                   <a:solidFill>
                     <a:srgbClr val="000000"/>
                   </a:solidFill>
@@ -663,7 +667,7 @@
             </a:ln>
             <a:extLst>
               <a:ext uri="{91240B29-F687-4f45-9708-019B960494DF}">
-                <a14:hiddenLine xmlns:a14="http://schemas.microsoft.com/office/drawing/2010/main" xmlns="" w="9525">
+                <a14:hiddenLine xmlns="" xmlns:a14="http://schemas.microsoft.com/office/drawing/2010/main" w="9525">
                   <a:solidFill>
                     <a:srgbClr val="000000"/>
                   </a:solidFill>
@@ -753,7 +757,7 @@
             </a:ln>
             <a:extLst>
               <a:ext uri="{91240B29-F687-4f45-9708-019B960494DF}">
-                <a14:hiddenLine xmlns:a14="http://schemas.microsoft.com/office/drawing/2010/main" xmlns="" w="9525">
+                <a14:hiddenLine xmlns="" xmlns:a14="http://schemas.microsoft.com/office/drawing/2010/main" w="9525">
                   <a:solidFill>
                     <a:srgbClr val="000000"/>
                   </a:solidFill>
@@ -815,7 +819,7 @@
             </a:ln>
             <a:extLst>
               <a:ext uri="{91240B29-F687-4f45-9708-019B960494DF}">
-                <a14:hiddenLine xmlns:a14="http://schemas.microsoft.com/office/drawing/2010/main" xmlns="" w="9525">
+                <a14:hiddenLine xmlns="" xmlns:a14="http://schemas.microsoft.com/office/drawing/2010/main" w="9525">
                   <a:solidFill>
                     <a:srgbClr val="000000"/>
                   </a:solidFill>
@@ -877,7 +881,7 @@
             </a:ln>
             <a:extLst>
               <a:ext uri="{91240B29-F687-4f45-9708-019B960494DF}">
-                <a14:hiddenLine xmlns:a14="http://schemas.microsoft.com/office/drawing/2010/main" xmlns="" w="9525">
+                <a14:hiddenLine xmlns="" xmlns:a14="http://schemas.microsoft.com/office/drawing/2010/main" w="9525">
                   <a:solidFill>
                     <a:srgbClr val="000000"/>
                   </a:solidFill>
@@ -967,7 +971,7 @@
             </a:ln>
             <a:extLst>
               <a:ext uri="{91240B29-F687-4f45-9708-019B960494DF}">
-                <a14:hiddenLine xmlns:a14="http://schemas.microsoft.com/office/drawing/2010/main" xmlns="" w="9525">
+                <a14:hiddenLine xmlns="" xmlns:a14="http://schemas.microsoft.com/office/drawing/2010/main" w="9525">
                   <a:solidFill>
                     <a:srgbClr val="000000"/>
                   </a:solidFill>
@@ -1057,7 +1061,7 @@
             </a:ln>
             <a:extLst>
               <a:ext uri="{91240B29-F687-4f45-9708-019B960494DF}">
-                <a14:hiddenLine xmlns:a14="http://schemas.microsoft.com/office/drawing/2010/main" xmlns="" w="9525">
+                <a14:hiddenLine xmlns="" xmlns:a14="http://schemas.microsoft.com/office/drawing/2010/main" w="9525">
                   <a:solidFill>
                     <a:srgbClr val="000000"/>
                   </a:solidFill>
@@ -1119,7 +1123,7 @@
             </a:ln>
             <a:extLst>
               <a:ext uri="{91240B29-F687-4f45-9708-019B960494DF}">
-                <a14:hiddenLine xmlns:a14="http://schemas.microsoft.com/office/drawing/2010/main" xmlns="" w="9525">
+                <a14:hiddenLine xmlns="" xmlns:a14="http://schemas.microsoft.com/office/drawing/2010/main" w="9525">
                   <a:solidFill>
                     <a:srgbClr val="000000"/>
                   </a:solidFill>
@@ -1229,7 +1233,7 @@
             </a:ln>
             <a:extLst>
               <a:ext uri="{91240B29-F687-4f45-9708-019B960494DF}">
-                <a14:hiddenLine xmlns:a14="http://schemas.microsoft.com/office/drawing/2010/main" xmlns="" w="9525">
+                <a14:hiddenLine xmlns="" xmlns:a14="http://schemas.microsoft.com/office/drawing/2010/main" w="9525">
                   <a:solidFill>
                     <a:srgbClr val="000000"/>
                   </a:solidFill>
@@ -1291,7 +1295,7 @@
             </a:ln>
             <a:extLst>
               <a:ext uri="{91240B29-F687-4f45-9708-019B960494DF}">
-                <a14:hiddenLine xmlns:a14="http://schemas.microsoft.com/office/drawing/2010/main" xmlns="" w="9525">
+                <a14:hiddenLine xmlns="" xmlns:a14="http://schemas.microsoft.com/office/drawing/2010/main" w="9525">
                   <a:solidFill>
                     <a:srgbClr val="000000"/>
                   </a:solidFill>
@@ -1381,7 +1385,7 @@
             </a:ln>
             <a:extLst>
               <a:ext uri="{91240B29-F687-4f45-9708-019B960494DF}">
-                <a14:hiddenLine xmlns:a14="http://schemas.microsoft.com/office/drawing/2010/main" xmlns="" w="9525">
+                <a14:hiddenLine xmlns="" xmlns:a14="http://schemas.microsoft.com/office/drawing/2010/main" w="9525">
                   <a:solidFill>
                     <a:srgbClr val="000000"/>
                   </a:solidFill>
@@ -1471,7 +1475,7 @@
             </a:ln>
             <a:extLst>
               <a:ext uri="{91240B29-F687-4f45-9708-019B960494DF}">
-                <a14:hiddenLine xmlns:a14="http://schemas.microsoft.com/office/drawing/2010/main" xmlns="" w="9525">
+                <a14:hiddenLine xmlns="" xmlns:a14="http://schemas.microsoft.com/office/drawing/2010/main" w="9525">
                   <a:solidFill>
                     <a:srgbClr val="000000"/>
                   </a:solidFill>
@@ -1533,7 +1537,7 @@
             </a:ln>
             <a:extLst>
               <a:ext uri="{91240B29-F687-4f45-9708-019B960494DF}">
-                <a14:hiddenLine xmlns:a14="http://schemas.microsoft.com/office/drawing/2010/main" xmlns="" w="9525">
+                <a14:hiddenLine xmlns="" xmlns:a14="http://schemas.microsoft.com/office/drawing/2010/main" w="9525">
                   <a:solidFill>
                     <a:srgbClr val="000000"/>
                   </a:solidFill>
@@ -1623,7 +1627,7 @@
             </a:ln>
             <a:extLst>
               <a:ext uri="{91240B29-F687-4f45-9708-019B960494DF}">
-                <a14:hiddenLine xmlns:a14="http://schemas.microsoft.com/office/drawing/2010/main" xmlns="" w="9525">
+                <a14:hiddenLine xmlns="" xmlns:a14="http://schemas.microsoft.com/office/drawing/2010/main" w="9525">
                   <a:solidFill>
                     <a:srgbClr val="000000"/>
                   </a:solidFill>
@@ -1713,7 +1717,7 @@
             </a:ln>
             <a:extLst>
               <a:ext uri="{91240B29-F687-4f45-9708-019B960494DF}">
-                <a14:hiddenLine xmlns:a14="http://schemas.microsoft.com/office/drawing/2010/main" xmlns="" w="9525">
+                <a14:hiddenLine xmlns="" xmlns:a14="http://schemas.microsoft.com/office/drawing/2010/main" w="9525">
                   <a:solidFill>
                     <a:srgbClr val="000000"/>
                   </a:solidFill>
@@ -1769,7 +1773,7 @@
             </a:ln>
             <a:extLst>
               <a:ext uri="{91240B29-F687-4f45-9708-019B960494DF}">
-                <a14:hiddenLine xmlns:a14="http://schemas.microsoft.com/office/drawing/2010/main" xmlns="" w="9525">
+                <a14:hiddenLine xmlns="" xmlns:a14="http://schemas.microsoft.com/office/drawing/2010/main" w="9525">
                   <a:solidFill>
                     <a:srgbClr val="000000"/>
                   </a:solidFill>
@@ -1859,7 +1863,7 @@
             </a:ln>
             <a:extLst>
               <a:ext uri="{91240B29-F687-4f45-9708-019B960494DF}">
-                <a14:hiddenLine xmlns:a14="http://schemas.microsoft.com/office/drawing/2010/main" xmlns="" w="9525">
+                <a14:hiddenLine xmlns="" xmlns:a14="http://schemas.microsoft.com/office/drawing/2010/main" w="9525">
                   <a:solidFill>
                     <a:srgbClr val="000000"/>
                   </a:solidFill>
@@ -1915,7 +1919,7 @@
             </a:ln>
             <a:extLst>
               <a:ext uri="{91240B29-F687-4f45-9708-019B960494DF}">
-                <a14:hiddenLine xmlns:a14="http://schemas.microsoft.com/office/drawing/2010/main" xmlns="" w="9525">
+                <a14:hiddenLine xmlns="" xmlns:a14="http://schemas.microsoft.com/office/drawing/2010/main" w="9525">
                   <a:solidFill>
                     <a:srgbClr val="000000"/>
                   </a:solidFill>
@@ -2005,7 +2009,7 @@
             </a:ln>
             <a:extLst>
               <a:ext uri="{91240B29-F687-4f45-9708-019B960494DF}">
-                <a14:hiddenLine xmlns:a14="http://schemas.microsoft.com/office/drawing/2010/main" xmlns="" w="9525">
+                <a14:hiddenLine xmlns="" xmlns:a14="http://schemas.microsoft.com/office/drawing/2010/main" w="9525">
                   <a:solidFill>
                     <a:srgbClr val="000000"/>
                   </a:solidFill>
@@ -2073,7 +2077,7 @@
             </a:ln>
             <a:extLst>
               <a:ext uri="{91240B29-F687-4f45-9708-019B960494DF}">
-                <a14:hiddenLine xmlns:a14="http://schemas.microsoft.com/office/drawing/2010/main" xmlns="" w="9525">
+                <a14:hiddenLine xmlns="" xmlns:a14="http://schemas.microsoft.com/office/drawing/2010/main" w="9525">
                   <a:solidFill>
                     <a:srgbClr val="000000"/>
                   </a:solidFill>
@@ -2163,7 +2167,7 @@
             </a:ln>
             <a:extLst>
               <a:ext uri="{91240B29-F687-4f45-9708-019B960494DF}">
-                <a14:hiddenLine xmlns:a14="http://schemas.microsoft.com/office/drawing/2010/main" xmlns="" w="9525">
+                <a14:hiddenLine xmlns="" xmlns:a14="http://schemas.microsoft.com/office/drawing/2010/main" w="9525">
                   <a:solidFill>
                     <a:srgbClr val="000000"/>
                   </a:solidFill>
@@ -2231,7 +2235,7 @@
             </a:ln>
             <a:extLst>
               <a:ext uri="{91240B29-F687-4f45-9708-019B960494DF}">
-                <a14:hiddenLine xmlns:a14="http://schemas.microsoft.com/office/drawing/2010/main" xmlns="" w="9525">
+                <a14:hiddenLine xmlns="" xmlns:a14="http://schemas.microsoft.com/office/drawing/2010/main" w="9525">
                   <a:solidFill>
                     <a:srgbClr val="000000"/>
                   </a:solidFill>
@@ -2321,7 +2325,7 @@
             </a:ln>
             <a:extLst>
               <a:ext uri="{91240B29-F687-4f45-9708-019B960494DF}">
-                <a14:hiddenLine xmlns:a14="http://schemas.microsoft.com/office/drawing/2010/main" xmlns="" w="9525">
+                <a14:hiddenLine xmlns="" xmlns:a14="http://schemas.microsoft.com/office/drawing/2010/main" w="9525">
                   <a:solidFill>
                     <a:srgbClr val="000000"/>
                   </a:solidFill>
@@ -2355,7 +2359,7 @@
             </a:ln>
             <a:extLst>
               <a:ext uri="{91240B29-F687-4f45-9708-019B960494DF}">
-                <a14:hiddenLine xmlns:a14="http://schemas.microsoft.com/office/drawing/2010/main" xmlns="" w="9525">
+                <a14:hiddenLine xmlns="" xmlns:a14="http://schemas.microsoft.com/office/drawing/2010/main" w="9525">
                   <a:solidFill>
                     <a:srgbClr val="000000"/>
                   </a:solidFill>
@@ -2445,7 +2449,7 @@
             </a:ln>
             <a:extLst>
               <a:ext uri="{91240B29-F687-4f45-9708-019B960494DF}">
-                <a14:hiddenLine xmlns:a14="http://schemas.microsoft.com/office/drawing/2010/main" xmlns="" w="9525">
+                <a14:hiddenLine xmlns="" xmlns:a14="http://schemas.microsoft.com/office/drawing/2010/main" w="9525">
                   <a:solidFill>
                     <a:srgbClr val="000000"/>
                   </a:solidFill>
@@ -2507,7 +2511,7 @@
             </a:ln>
             <a:extLst>
               <a:ext uri="{91240B29-F687-4f45-9708-019B960494DF}">
-                <a14:hiddenLine xmlns:a14="http://schemas.microsoft.com/office/drawing/2010/main" xmlns="" w="9525">
+                <a14:hiddenLine xmlns="" xmlns:a14="http://schemas.microsoft.com/office/drawing/2010/main" w="9525">
                   <a:solidFill>
                     <a:srgbClr val="000000"/>
                   </a:solidFill>
@@ -2569,7 +2573,7 @@
             </a:ln>
             <a:extLst>
               <a:ext uri="{91240B29-F687-4f45-9708-019B960494DF}">
-                <a14:hiddenLine xmlns:a14="http://schemas.microsoft.com/office/drawing/2010/main" xmlns="" w="9525">
+                <a14:hiddenLine xmlns="" xmlns:a14="http://schemas.microsoft.com/office/drawing/2010/main" w="9525">
                   <a:solidFill>
                     <a:srgbClr val="000000"/>
                   </a:solidFill>
@@ -2659,7 +2663,7 @@
             </a:ln>
             <a:extLst>
               <a:ext uri="{91240B29-F687-4f45-9708-019B960494DF}">
-                <a14:hiddenLine xmlns:a14="http://schemas.microsoft.com/office/drawing/2010/main" xmlns="" w="9525">
+                <a14:hiddenLine xmlns="" xmlns:a14="http://schemas.microsoft.com/office/drawing/2010/main" w="9525">
                   <a:solidFill>
                     <a:srgbClr val="000000"/>
                   </a:solidFill>
@@ -2727,7 +2731,7 @@
             </a:ln>
             <a:extLst>
               <a:ext uri="{91240B29-F687-4f45-9708-019B960494DF}">
-                <a14:hiddenLine xmlns:a14="http://schemas.microsoft.com/office/drawing/2010/main" xmlns="" w="9525">
+                <a14:hiddenLine xmlns="" xmlns:a14="http://schemas.microsoft.com/office/drawing/2010/main" w="9525">
                   <a:solidFill>
                     <a:srgbClr val="000000"/>
                   </a:solidFill>
@@ -2789,7 +2793,7 @@
             </a:ln>
             <a:extLst>
               <a:ext uri="{91240B29-F687-4f45-9708-019B960494DF}">
-                <a14:hiddenLine xmlns:a14="http://schemas.microsoft.com/office/drawing/2010/main" xmlns="" w="9525">
+                <a14:hiddenLine xmlns="" xmlns:a14="http://schemas.microsoft.com/office/drawing/2010/main" w="9525">
                   <a:solidFill>
                     <a:srgbClr val="000000"/>
                   </a:solidFill>
@@ -2879,7 +2883,7 @@
             </a:ln>
             <a:extLst>
               <a:ext uri="{91240B29-F687-4f45-9708-019B960494DF}">
-                <a14:hiddenLine xmlns:a14="http://schemas.microsoft.com/office/drawing/2010/main" xmlns="" w="9525">
+                <a14:hiddenLine xmlns="" xmlns:a14="http://schemas.microsoft.com/office/drawing/2010/main" w="9525">
                   <a:solidFill>
                     <a:srgbClr val="000000"/>
                   </a:solidFill>
@@ -2941,7 +2945,7 @@
             </a:ln>
             <a:extLst>
               <a:ext uri="{91240B29-F687-4f45-9708-019B960494DF}">
-                <a14:hiddenLine xmlns:a14="http://schemas.microsoft.com/office/drawing/2010/main" xmlns="" w="9525">
+                <a14:hiddenLine xmlns="" xmlns:a14="http://schemas.microsoft.com/office/drawing/2010/main" w="9525">
                   <a:solidFill>
                     <a:srgbClr val="000000"/>
                   </a:solidFill>
@@ -3031,7 +3035,7 @@
             </a:ln>
             <a:extLst>
               <a:ext uri="{91240B29-F687-4f45-9708-019B960494DF}">
-                <a14:hiddenLine xmlns:a14="http://schemas.microsoft.com/office/drawing/2010/main" xmlns="" w="9525">
+                <a14:hiddenLine xmlns="" xmlns:a14="http://schemas.microsoft.com/office/drawing/2010/main" w="9525">
                   <a:solidFill>
                     <a:srgbClr val="000000"/>
                   </a:solidFill>
@@ -3093,7 +3097,7 @@
             </a:ln>
             <a:extLst>
               <a:ext uri="{91240B29-F687-4f45-9708-019B960494DF}">
-                <a14:hiddenLine xmlns:a14="http://schemas.microsoft.com/office/drawing/2010/main" xmlns="" w="9525">
+                <a14:hiddenLine xmlns="" xmlns:a14="http://schemas.microsoft.com/office/drawing/2010/main" w="9525">
                   <a:solidFill>
                     <a:srgbClr val="000000"/>
                   </a:solidFill>
@@ -3183,7 +3187,7 @@
             </a:ln>
             <a:extLst>
               <a:ext uri="{91240B29-F687-4f45-9708-019B960494DF}">
-                <a14:hiddenLine xmlns:a14="http://schemas.microsoft.com/office/drawing/2010/main" xmlns="" w="9525">
+                <a14:hiddenLine xmlns="" xmlns:a14="http://schemas.microsoft.com/office/drawing/2010/main" w="9525">
                   <a:solidFill>
                     <a:srgbClr val="000000"/>
                   </a:solidFill>
@@ -3217,7 +3221,7 @@
             </a:ln>
             <a:extLst>
               <a:ext uri="{91240B29-F687-4f45-9708-019B960494DF}">
-                <a14:hiddenLine xmlns:a14="http://schemas.microsoft.com/office/drawing/2010/main" xmlns="" w="9525">
+                <a14:hiddenLine xmlns="" xmlns:a14="http://schemas.microsoft.com/office/drawing/2010/main" w="9525">
                   <a:solidFill>
                     <a:srgbClr val="000000"/>
                   </a:solidFill>
@@ -3282,7 +3286,7 @@
             </a:ln>
             <a:extLst>
               <a:ext uri="{91240B29-F687-4f45-9708-019B960494DF}">
-                <a14:hiddenLine xmlns:a14="http://schemas.microsoft.com/office/drawing/2010/main" xmlns="" w="9525">
+                <a14:hiddenLine xmlns="" xmlns:a14="http://schemas.microsoft.com/office/drawing/2010/main" w="9525">
                   <a:solidFill>
                     <a:srgbClr val="000000"/>
                   </a:solidFill>
@@ -3372,7 +3376,7 @@
             </a:ln>
             <a:extLst>
               <a:ext uri="{91240B29-F687-4f45-9708-019B960494DF}">
-                <a14:hiddenLine xmlns:a14="http://schemas.microsoft.com/office/drawing/2010/main" xmlns="" w="9525">
+                <a14:hiddenLine xmlns="" xmlns:a14="http://schemas.microsoft.com/office/drawing/2010/main" w="9525">
                   <a:solidFill>
                     <a:srgbClr val="000000"/>
                   </a:solidFill>
@@ -3434,7 +3438,7 @@
             </a:ln>
             <a:extLst>
               <a:ext uri="{91240B29-F687-4f45-9708-019B960494DF}">
-                <a14:hiddenLine xmlns:a14="http://schemas.microsoft.com/office/drawing/2010/main" xmlns="" w="9525">
+                <a14:hiddenLine xmlns="" xmlns:a14="http://schemas.microsoft.com/office/drawing/2010/main" w="9525">
                   <a:solidFill>
                     <a:srgbClr val="000000"/>
                   </a:solidFill>
@@ -3524,7 +3528,7 @@
             </a:ln>
             <a:extLst>
               <a:ext uri="{91240B29-F687-4f45-9708-019B960494DF}">
-                <a14:hiddenLine xmlns:a14="http://schemas.microsoft.com/office/drawing/2010/main" xmlns="" w="9525">
+                <a14:hiddenLine xmlns="" xmlns:a14="http://schemas.microsoft.com/office/drawing/2010/main" w="9525">
                   <a:solidFill>
                     <a:srgbClr val="000000"/>
                   </a:solidFill>
@@ -3614,7 +3618,7 @@
             </a:ln>
             <a:extLst>
               <a:ext uri="{91240B29-F687-4f45-9708-019B960494DF}">
-                <a14:hiddenLine xmlns:a14="http://schemas.microsoft.com/office/drawing/2010/main" xmlns="" w="9525">
+                <a14:hiddenLine xmlns="" xmlns:a14="http://schemas.microsoft.com/office/drawing/2010/main" w="9525">
                   <a:solidFill>
                     <a:srgbClr val="000000"/>
                   </a:solidFill>
@@ -3679,7 +3683,7 @@
             </a:ln>
             <a:extLst>
               <a:ext uri="{91240B29-F687-4f45-9708-019B960494DF}">
-                <a14:hiddenLine xmlns:a14="http://schemas.microsoft.com/office/drawing/2010/main" xmlns="" w="9525">
+                <a14:hiddenLine xmlns="" xmlns:a14="http://schemas.microsoft.com/office/drawing/2010/main" w="9525">
                   <a:solidFill>
                     <a:srgbClr val="000000"/>
                   </a:solidFill>
@@ -3741,7 +3745,7 @@
             </a:ln>
             <a:extLst>
               <a:ext uri="{91240B29-F687-4f45-9708-019B960494DF}">
-                <a14:hiddenLine xmlns:a14="http://schemas.microsoft.com/office/drawing/2010/main" xmlns="" w="9525">
+                <a14:hiddenLine xmlns="" xmlns:a14="http://schemas.microsoft.com/office/drawing/2010/main" w="9525">
                   <a:solidFill>
                     <a:srgbClr val="000000"/>
                   </a:solidFill>
@@ -3831,7 +3835,7 @@
             </a:ln>
             <a:extLst>
               <a:ext uri="{91240B29-F687-4f45-9708-019B960494DF}">
-                <a14:hiddenLine xmlns:a14="http://schemas.microsoft.com/office/drawing/2010/main" xmlns="" w="9525">
+                <a14:hiddenLine xmlns="" xmlns:a14="http://schemas.microsoft.com/office/drawing/2010/main" w="9525">
                   <a:solidFill>
                     <a:srgbClr val="000000"/>
                   </a:solidFill>
@@ -3921,7 +3925,7 @@
             </a:ln>
             <a:extLst>
               <a:ext uri="{91240B29-F687-4f45-9708-019B960494DF}">
-                <a14:hiddenLine xmlns:a14="http://schemas.microsoft.com/office/drawing/2010/main" xmlns="" w="9525">
+                <a14:hiddenLine xmlns="" xmlns:a14="http://schemas.microsoft.com/office/drawing/2010/main" w="9525">
                   <a:solidFill>
                     <a:srgbClr val="000000"/>
                   </a:solidFill>
@@ -3983,7 +3987,7 @@
             </a:ln>
             <a:extLst>
               <a:ext uri="{91240B29-F687-4f45-9708-019B960494DF}">
-                <a14:hiddenLine xmlns:a14="http://schemas.microsoft.com/office/drawing/2010/main" xmlns="" w="9525">
+                <a14:hiddenLine xmlns="" xmlns:a14="http://schemas.microsoft.com/office/drawing/2010/main" w="9525">
                   <a:solidFill>
                     <a:srgbClr val="000000"/>
                   </a:solidFill>
@@ -4103,7 +4107,7 @@
             </a:ln>
             <a:extLst>
               <a:ext uri="{91240B29-F687-4f45-9708-019B960494DF}">
-                <a14:hiddenLine xmlns:a14="http://schemas.microsoft.com/office/drawing/2010/main" xmlns="" w="9525">
+                <a14:hiddenLine xmlns="" xmlns:a14="http://schemas.microsoft.com/office/drawing/2010/main" w="9525">
                   <a:solidFill>
                     <a:srgbClr val="000000"/>
                   </a:solidFill>
@@ -4171,7 +4175,7 @@
             </a:ln>
             <a:extLst>
               <a:ext uri="{91240B29-F687-4f45-9708-019B960494DF}">
-                <a14:hiddenLine xmlns:a14="http://schemas.microsoft.com/office/drawing/2010/main" xmlns="" w="9525">
+                <a14:hiddenLine xmlns="" xmlns:a14="http://schemas.microsoft.com/office/drawing/2010/main" w="9525">
                   <a:solidFill>
                     <a:srgbClr val="000000"/>
                   </a:solidFill>
@@ -4261,7 +4265,7 @@
             </a:ln>
             <a:extLst>
               <a:ext uri="{91240B29-F687-4f45-9708-019B960494DF}">
-                <a14:hiddenLine xmlns:a14="http://schemas.microsoft.com/office/drawing/2010/main" xmlns="" w="9525">
+                <a14:hiddenLine xmlns="" xmlns:a14="http://schemas.microsoft.com/office/drawing/2010/main" w="9525">
                   <a:solidFill>
                     <a:srgbClr val="000000"/>
                   </a:solidFill>
@@ -9092,7 +9096,7 @@
           <a:noFill/>
           <a:extLst>
             <a:ext uri="{909E8E84-426E-40dd-AFC4-6F175D3DCCD1}">
-              <a14:hiddenFill xmlns:a14="http://schemas.microsoft.com/office/drawing/2010/main" xmlns="">
+              <a14:hiddenFill xmlns="" xmlns:a14="http://schemas.microsoft.com/office/drawing/2010/main">
                 <a:solidFill>
                   <a:srgbClr val="FFFFFF"/>
                 </a:solidFill>
@@ -9166,7 +9170,7 @@
               </a:ln>
               <a:extLst>
                 <a:ext uri="{91240B29-F687-4f45-9708-019B960494DF}">
-                  <a14:hiddenLine xmlns:a14="http://schemas.microsoft.com/office/drawing/2010/main" xmlns="" w="9525">
+                  <a14:hiddenLine xmlns="" xmlns:a14="http://schemas.microsoft.com/office/drawing/2010/main" w="9525">
                     <a:solidFill>
                       <a:srgbClr val="000000"/>
                     </a:solidFill>
@@ -9256,7 +9260,7 @@
               </a:ln>
               <a:extLst>
                 <a:ext uri="{91240B29-F687-4f45-9708-019B960494DF}">
-                  <a14:hiddenLine xmlns:a14="http://schemas.microsoft.com/office/drawing/2010/main" xmlns="" w="9525">
+                  <a14:hiddenLine xmlns="" xmlns:a14="http://schemas.microsoft.com/office/drawing/2010/main" w="9525">
                     <a:solidFill>
                       <a:srgbClr val="000000"/>
                     </a:solidFill>
@@ -9346,7 +9350,7 @@
               </a:ln>
               <a:extLst>
                 <a:ext uri="{91240B29-F687-4f45-9708-019B960494DF}">
-                  <a14:hiddenLine xmlns:a14="http://schemas.microsoft.com/office/drawing/2010/main" xmlns="" w="9525">
+                  <a14:hiddenLine xmlns="" xmlns:a14="http://schemas.microsoft.com/office/drawing/2010/main" w="9525">
                     <a:solidFill>
                       <a:srgbClr val="000000"/>
                     </a:solidFill>
@@ -9408,7 +9412,7 @@
               </a:ln>
               <a:extLst>
                 <a:ext uri="{91240B29-F687-4f45-9708-019B960494DF}">
-                  <a14:hiddenLine xmlns:a14="http://schemas.microsoft.com/office/drawing/2010/main" xmlns="" w="9525">
+                  <a14:hiddenLine xmlns="" xmlns:a14="http://schemas.microsoft.com/office/drawing/2010/main" w="9525">
                     <a:solidFill>
                       <a:srgbClr val="000000"/>
                     </a:solidFill>
@@ -9498,7 +9502,7 @@
               </a:ln>
               <a:extLst>
                 <a:ext uri="{91240B29-F687-4f45-9708-019B960494DF}">
-                  <a14:hiddenLine xmlns:a14="http://schemas.microsoft.com/office/drawing/2010/main" xmlns="" w="9525">
+                  <a14:hiddenLine xmlns="" xmlns:a14="http://schemas.microsoft.com/office/drawing/2010/main" w="9525">
                     <a:solidFill>
                       <a:srgbClr val="000000"/>
                     </a:solidFill>
@@ -9560,7 +9564,7 @@
               </a:ln>
               <a:extLst>
                 <a:ext uri="{91240B29-F687-4f45-9708-019B960494DF}">
-                  <a14:hiddenLine xmlns:a14="http://schemas.microsoft.com/office/drawing/2010/main" xmlns="" w="9525">
+                  <a14:hiddenLine xmlns="" xmlns:a14="http://schemas.microsoft.com/office/drawing/2010/main" w="9525">
                     <a:solidFill>
                       <a:srgbClr val="000000"/>
                     </a:solidFill>
@@ -9622,7 +9626,7 @@
               </a:ln>
               <a:extLst>
                 <a:ext uri="{91240B29-F687-4f45-9708-019B960494DF}">
-                  <a14:hiddenLine xmlns:a14="http://schemas.microsoft.com/office/drawing/2010/main" xmlns="" w="9525">
+                  <a14:hiddenLine xmlns="" xmlns:a14="http://schemas.microsoft.com/office/drawing/2010/main" w="9525">
                     <a:solidFill>
                       <a:srgbClr val="000000"/>
                     </a:solidFill>
@@ -9712,7 +9716,7 @@
               </a:ln>
               <a:extLst>
                 <a:ext uri="{91240B29-F687-4f45-9708-019B960494DF}">
-                  <a14:hiddenLine xmlns:a14="http://schemas.microsoft.com/office/drawing/2010/main" xmlns="" w="9525">
+                  <a14:hiddenLine xmlns="" xmlns:a14="http://schemas.microsoft.com/office/drawing/2010/main" w="9525">
                     <a:solidFill>
                       <a:srgbClr val="000000"/>
                     </a:solidFill>
@@ -9802,7 +9806,7 @@
               </a:ln>
               <a:extLst>
                 <a:ext uri="{91240B29-F687-4f45-9708-019B960494DF}">
-                  <a14:hiddenLine xmlns:a14="http://schemas.microsoft.com/office/drawing/2010/main" xmlns="" w="9525">
+                  <a14:hiddenLine xmlns="" xmlns:a14="http://schemas.microsoft.com/office/drawing/2010/main" w="9525">
                     <a:solidFill>
                       <a:srgbClr val="000000"/>
                     </a:solidFill>
@@ -9864,7 +9868,7 @@
               </a:ln>
               <a:extLst>
                 <a:ext uri="{91240B29-F687-4f45-9708-019B960494DF}">
-                  <a14:hiddenLine xmlns:a14="http://schemas.microsoft.com/office/drawing/2010/main" xmlns="" w="9525">
+                  <a14:hiddenLine xmlns="" xmlns:a14="http://schemas.microsoft.com/office/drawing/2010/main" w="9525">
                     <a:solidFill>
                       <a:srgbClr val="000000"/>
                     </a:solidFill>
@@ -9974,7 +9978,7 @@
               </a:ln>
               <a:extLst>
                 <a:ext uri="{91240B29-F687-4f45-9708-019B960494DF}">
-                  <a14:hiddenLine xmlns:a14="http://schemas.microsoft.com/office/drawing/2010/main" xmlns="" w="9525">
+                  <a14:hiddenLine xmlns="" xmlns:a14="http://schemas.microsoft.com/office/drawing/2010/main" w="9525">
                     <a:solidFill>
                       <a:srgbClr val="000000"/>
                     </a:solidFill>
@@ -10058,7 +10062,7 @@
               </a:ln>
               <a:extLst>
                 <a:ext uri="{91240B29-F687-4f45-9708-019B960494DF}">
-                  <a14:hiddenLine xmlns:a14="http://schemas.microsoft.com/office/drawing/2010/main" xmlns="" w="9525">
+                  <a14:hiddenLine xmlns="" xmlns:a14="http://schemas.microsoft.com/office/drawing/2010/main" w="9525">
                     <a:solidFill>
                       <a:srgbClr val="000000"/>
                     </a:solidFill>
@@ -10120,7 +10124,7 @@
               </a:ln>
               <a:extLst>
                 <a:ext uri="{91240B29-F687-4f45-9708-019B960494DF}">
-                  <a14:hiddenLine xmlns:a14="http://schemas.microsoft.com/office/drawing/2010/main" xmlns="" w="9525">
+                  <a14:hiddenLine xmlns="" xmlns:a14="http://schemas.microsoft.com/office/drawing/2010/main" w="9525">
                     <a:solidFill>
                       <a:srgbClr val="000000"/>
                     </a:solidFill>
@@ -10182,7 +10186,7 @@
               </a:ln>
               <a:extLst>
                 <a:ext uri="{91240B29-F687-4f45-9708-019B960494DF}">
-                  <a14:hiddenLine xmlns:a14="http://schemas.microsoft.com/office/drawing/2010/main" xmlns="" w="9525">
+                  <a14:hiddenLine xmlns="" xmlns:a14="http://schemas.microsoft.com/office/drawing/2010/main" w="9525">
                     <a:solidFill>
                       <a:srgbClr val="000000"/>
                     </a:solidFill>
@@ -10272,7 +10276,7 @@
               </a:ln>
               <a:extLst>
                 <a:ext uri="{91240B29-F687-4f45-9708-019B960494DF}">
-                  <a14:hiddenLine xmlns:a14="http://schemas.microsoft.com/office/drawing/2010/main" xmlns="" w="9525">
+                  <a14:hiddenLine xmlns="" xmlns:a14="http://schemas.microsoft.com/office/drawing/2010/main" w="9525">
                     <a:solidFill>
                       <a:srgbClr val="000000"/>
                     </a:solidFill>
@@ -10306,7 +10310,7 @@
               </a:ln>
               <a:extLst>
                 <a:ext uri="{91240B29-F687-4f45-9708-019B960494DF}">
-                  <a14:hiddenLine xmlns:a14="http://schemas.microsoft.com/office/drawing/2010/main" xmlns="" w="9525">
+                  <a14:hiddenLine xmlns="" xmlns:a14="http://schemas.microsoft.com/office/drawing/2010/main" w="9525">
                     <a:solidFill>
                       <a:srgbClr val="000000"/>
                     </a:solidFill>
@@ -10371,7 +10375,7 @@
               </a:ln>
               <a:extLst>
                 <a:ext uri="{91240B29-F687-4f45-9708-019B960494DF}">
-                  <a14:hiddenLine xmlns:a14="http://schemas.microsoft.com/office/drawing/2010/main" xmlns="" w="9525">
+                  <a14:hiddenLine xmlns="" xmlns:a14="http://schemas.microsoft.com/office/drawing/2010/main" w="9525">
                     <a:solidFill>
                       <a:srgbClr val="000000"/>
                     </a:solidFill>
@@ -10461,7 +10465,7 @@
               </a:ln>
               <a:extLst>
                 <a:ext uri="{91240B29-F687-4f45-9708-019B960494DF}">
-                  <a14:hiddenLine xmlns:a14="http://schemas.microsoft.com/office/drawing/2010/main" xmlns="" w="9525">
+                  <a14:hiddenLine xmlns="" xmlns:a14="http://schemas.microsoft.com/office/drawing/2010/main" w="9525">
                     <a:solidFill>
                       <a:srgbClr val="000000"/>
                     </a:solidFill>
@@ -10523,7 +10527,7 @@
               </a:ln>
               <a:extLst>
                 <a:ext uri="{91240B29-F687-4f45-9708-019B960494DF}">
-                  <a14:hiddenLine xmlns:a14="http://schemas.microsoft.com/office/drawing/2010/main" xmlns="" w="9525">
+                  <a14:hiddenLine xmlns="" xmlns:a14="http://schemas.microsoft.com/office/drawing/2010/main" w="9525">
                     <a:solidFill>
                       <a:srgbClr val="000000"/>
                     </a:solidFill>
@@ -10613,7 +10617,7 @@
               </a:ln>
               <a:extLst>
                 <a:ext uri="{91240B29-F687-4f45-9708-019B960494DF}">
-                  <a14:hiddenLine xmlns:a14="http://schemas.microsoft.com/office/drawing/2010/main" xmlns="" w="9525">
+                  <a14:hiddenLine xmlns="" xmlns:a14="http://schemas.microsoft.com/office/drawing/2010/main" w="9525">
                     <a:solidFill>
                       <a:srgbClr val="000000"/>
                     </a:solidFill>
@@ -10678,7 +10682,7 @@
               </a:ln>
               <a:extLst>
                 <a:ext uri="{91240B29-F687-4f45-9708-019B960494DF}">
-                  <a14:hiddenLine xmlns:a14="http://schemas.microsoft.com/office/drawing/2010/main" xmlns="" w="9525">
+                  <a14:hiddenLine xmlns="" xmlns:a14="http://schemas.microsoft.com/office/drawing/2010/main" w="9525">
                     <a:solidFill>
                       <a:srgbClr val="000000"/>
                     </a:solidFill>
@@ -10740,7 +10744,7 @@
               </a:ln>
               <a:extLst>
                 <a:ext uri="{91240B29-F687-4f45-9708-019B960494DF}">
-                  <a14:hiddenLine xmlns:a14="http://schemas.microsoft.com/office/drawing/2010/main" xmlns="" w="9525">
+                  <a14:hiddenLine xmlns="" xmlns:a14="http://schemas.microsoft.com/office/drawing/2010/main" w="9525">
                     <a:solidFill>
                       <a:srgbClr val="000000"/>
                     </a:solidFill>
@@ -10830,7 +10834,7 @@
               </a:ln>
               <a:extLst>
                 <a:ext uri="{91240B29-F687-4f45-9708-019B960494DF}">
-                  <a14:hiddenLine xmlns:a14="http://schemas.microsoft.com/office/drawing/2010/main" xmlns="" w="9525">
+                  <a14:hiddenLine xmlns="" xmlns:a14="http://schemas.microsoft.com/office/drawing/2010/main" w="9525">
                     <a:solidFill>
                       <a:srgbClr val="000000"/>
                     </a:solidFill>
@@ -10920,7 +10924,7 @@
               </a:ln>
               <a:extLst>
                 <a:ext uri="{91240B29-F687-4f45-9708-019B960494DF}">
-                  <a14:hiddenLine xmlns:a14="http://schemas.microsoft.com/office/drawing/2010/main" xmlns="" w="9525">
+                  <a14:hiddenLine xmlns="" xmlns:a14="http://schemas.microsoft.com/office/drawing/2010/main" w="9525">
                     <a:solidFill>
                       <a:srgbClr val="000000"/>
                     </a:solidFill>
@@ -10985,7 +10989,7 @@
               </a:ln>
               <a:extLst>
                 <a:ext uri="{91240B29-F687-4f45-9708-019B960494DF}">
-                  <a14:hiddenLine xmlns:a14="http://schemas.microsoft.com/office/drawing/2010/main" xmlns="" w="9525">
+                  <a14:hiddenLine xmlns="" xmlns:a14="http://schemas.microsoft.com/office/drawing/2010/main" w="9525">
                     <a:solidFill>
                       <a:srgbClr val="000000"/>
                     </a:solidFill>
@@ -11105,7 +11109,7 @@
               </a:ln>
               <a:extLst>
                 <a:ext uri="{91240B29-F687-4f45-9708-019B960494DF}">
-                  <a14:hiddenLine xmlns:a14="http://schemas.microsoft.com/office/drawing/2010/main" xmlns="" w="9525">
+                  <a14:hiddenLine xmlns="" xmlns:a14="http://schemas.microsoft.com/office/drawing/2010/main" w="9525">
                     <a:solidFill>
                       <a:srgbClr val="000000"/>
                     </a:solidFill>
@@ -11186,7 +11190,7 @@
               </a:ln>
               <a:extLst>
                 <a:ext uri="{91240B29-F687-4f45-9708-019B960494DF}">
-                  <a14:hiddenLine xmlns:a14="http://schemas.microsoft.com/office/drawing/2010/main" xmlns="" w="9525">
+                  <a14:hiddenLine xmlns="" xmlns:a14="http://schemas.microsoft.com/office/drawing/2010/main" w="9525">
                     <a:solidFill>
                       <a:srgbClr val="000000"/>
                     </a:solidFill>
@@ -11301,7 +11305,7 @@
               </a:ln>
               <a:extLst>
                 <a:ext uri="{91240B29-F687-4f45-9708-019B960494DF}">
-                  <a14:hiddenLine xmlns:a14="http://schemas.microsoft.com/office/drawing/2010/main" xmlns="" w="9525">
+                  <a14:hiddenLine xmlns="" xmlns:a14="http://schemas.microsoft.com/office/drawing/2010/main" w="9525">
                     <a:solidFill>
                       <a:srgbClr val="000000"/>
                     </a:solidFill>
@@ -11391,7 +11395,7 @@
               </a:ln>
               <a:extLst>
                 <a:ext uri="{91240B29-F687-4f45-9708-019B960494DF}">
-                  <a14:hiddenLine xmlns:a14="http://schemas.microsoft.com/office/drawing/2010/main" xmlns="" w="9525">
+                  <a14:hiddenLine xmlns="" xmlns:a14="http://schemas.microsoft.com/office/drawing/2010/main" w="9525">
                     <a:solidFill>
                       <a:srgbClr val="000000"/>
                     </a:solidFill>
@@ -11456,7 +11460,7 @@
               </a:ln>
               <a:extLst>
                 <a:ext uri="{91240B29-F687-4f45-9708-019B960494DF}">
-                  <a14:hiddenLine xmlns:a14="http://schemas.microsoft.com/office/drawing/2010/main" xmlns="" w="9525">
+                  <a14:hiddenLine xmlns="" xmlns:a14="http://schemas.microsoft.com/office/drawing/2010/main" w="9525">
                     <a:solidFill>
                       <a:srgbClr val="000000"/>
                     </a:solidFill>
@@ -11546,7 +11550,7 @@
               </a:ln>
               <a:extLst>
                 <a:ext uri="{91240B29-F687-4f45-9708-019B960494DF}">
-                  <a14:hiddenLine xmlns:a14="http://schemas.microsoft.com/office/drawing/2010/main" xmlns="" w="9525">
+                  <a14:hiddenLine xmlns="" xmlns:a14="http://schemas.microsoft.com/office/drawing/2010/main" w="9525">
                     <a:solidFill>
                       <a:srgbClr val="000000"/>
                     </a:solidFill>
@@ -11614,7 +11618,7 @@
               </a:ln>
               <a:extLst>
                 <a:ext uri="{91240B29-F687-4f45-9708-019B960494DF}">
-                  <a14:hiddenLine xmlns:a14="http://schemas.microsoft.com/office/drawing/2010/main" xmlns="" w="9525">
+                  <a14:hiddenLine xmlns="" xmlns:a14="http://schemas.microsoft.com/office/drawing/2010/main" w="9525">
                     <a:solidFill>
                       <a:srgbClr val="000000"/>
                     </a:solidFill>
@@ -11704,7 +11708,7 @@
               </a:ln>
               <a:extLst>
                 <a:ext uri="{91240B29-F687-4f45-9708-019B960494DF}">
-                  <a14:hiddenLine xmlns:a14="http://schemas.microsoft.com/office/drawing/2010/main" xmlns="" w="9525">
+                  <a14:hiddenLine xmlns="" xmlns:a14="http://schemas.microsoft.com/office/drawing/2010/main" w="9525">
                     <a:solidFill>
                       <a:srgbClr val="000000"/>
                     </a:solidFill>
@@ -11772,7 +11776,7 @@
               </a:ln>
               <a:extLst>
                 <a:ext uri="{91240B29-F687-4f45-9708-019B960494DF}">
-                  <a14:hiddenLine xmlns:a14="http://schemas.microsoft.com/office/drawing/2010/main" xmlns="" w="9525">
+                  <a14:hiddenLine xmlns="" xmlns:a14="http://schemas.microsoft.com/office/drawing/2010/main" w="9525">
                     <a:solidFill>
                       <a:srgbClr val="000000"/>
                     </a:solidFill>
@@ -11862,7 +11866,7 @@
               </a:ln>
               <a:extLst>
                 <a:ext uri="{91240B29-F687-4f45-9708-019B960494DF}">
-                  <a14:hiddenLine xmlns:a14="http://schemas.microsoft.com/office/drawing/2010/main" xmlns="" w="9525">
+                  <a14:hiddenLine xmlns="" xmlns:a14="http://schemas.microsoft.com/office/drawing/2010/main" w="9525">
                     <a:solidFill>
                       <a:srgbClr val="000000"/>
                     </a:solidFill>
@@ -11896,7 +11900,7 @@
               </a:ln>
               <a:extLst>
                 <a:ext uri="{91240B29-F687-4f45-9708-019B960494DF}">
-                  <a14:hiddenLine xmlns:a14="http://schemas.microsoft.com/office/drawing/2010/main" xmlns="" w="9525">
+                  <a14:hiddenLine xmlns="" xmlns:a14="http://schemas.microsoft.com/office/drawing/2010/main" w="9525">
                     <a:solidFill>
                       <a:srgbClr val="000000"/>
                     </a:solidFill>
@@ -12775,6 +12779,413 @@
 </p:sld>
 </file>
 
+<file path=ppt/slides/slide10.xml><?xml version="1.0" encoding="utf-8"?>
+<p:sld xmlns:a="http://schemas.openxmlformats.org/drawingml/2006/main" xmlns:r="http://schemas.openxmlformats.org/officeDocument/2006/relationships" xmlns:p="http://schemas.openxmlformats.org/presentationml/2006/main">
+  <p:cSld>
+    <p:spTree>
+      <p:nvGrpSpPr>
+        <p:cNvPr id="1" name=""/>
+        <p:cNvGrpSpPr/>
+        <p:nvPr/>
+      </p:nvGrpSpPr>
+      <p:grpSpPr>
+        <a:xfrm>
+          <a:off x="0" y="0"/>
+          <a:ext cx="0" cy="0"/>
+          <a:chOff x="0" y="0"/>
+          <a:chExt cx="0" cy="0"/>
+        </a:xfrm>
+      </p:grpSpPr>
+      <p:sp>
+        <p:nvSpPr>
+          <p:cNvPr id="2" name="Título 1">
+            <a:extLst>
+              <a:ext uri="{FF2B5EF4-FFF2-40B4-BE49-F238E27FC236}">
+                <a16:creationId xmlns:a16="http://schemas.microsoft.com/office/drawing/2014/main" id="{CCA92837-DF66-6930-D795-EEBF065437BB}"/>
+              </a:ext>
+            </a:extLst>
+          </p:cNvPr>
+          <p:cNvSpPr>
+            <a:spLocks noGrp="1"/>
+          </p:cNvSpPr>
+          <p:nvPr>
+            <p:ph type="title"/>
+          </p:nvPr>
+        </p:nvSpPr>
+        <p:spPr/>
+        <p:txBody>
+          <a:bodyPr/>
+          <a:lstStyle/>
+          <a:p>
+            <a:r>
+              <a:rPr lang="es-ES" dirty="0"/>
+              <a:t>Vías de mejora</a:t>
+            </a:r>
+          </a:p>
+        </p:txBody>
+      </p:sp>
+      <p:sp>
+        <p:nvSpPr>
+          <p:cNvPr id="3" name="Marcador de contenido 2">
+            <a:extLst>
+              <a:ext uri="{FF2B5EF4-FFF2-40B4-BE49-F238E27FC236}">
+                <a16:creationId xmlns:a16="http://schemas.microsoft.com/office/drawing/2014/main" id="{F78D01F6-8814-7E32-CEE3-A38C2C208601}"/>
+              </a:ext>
+            </a:extLst>
+          </p:cNvPr>
+          <p:cNvSpPr>
+            <a:spLocks noGrp="1"/>
+          </p:cNvSpPr>
+          <p:nvPr>
+            <p:ph idx="1"/>
+          </p:nvPr>
+        </p:nvSpPr>
+        <p:spPr/>
+        <p:txBody>
+          <a:bodyPr>
+            <a:normAutofit/>
+          </a:bodyPr>
+          <a:lstStyle/>
+          <a:p>
+            <a:pPr marL="0" indent="0">
+              <a:buNone/>
+            </a:pPr>
+            <a:r>
+              <a:rPr lang="es-ES" dirty="0"/>
+              <a:t>Para poder mejorar el proyecto realizado se podrían haber implementado las siguientes vías de mejora:</a:t>
+            </a:r>
+          </a:p>
+          <a:p>
+            <a:pPr marL="0" indent="0">
+              <a:buNone/>
+            </a:pPr>
+            <a:r>
+              <a:rPr lang="es-ES" dirty="0"/>
+              <a:t>- Crear una interfaz web mas amigable.</a:t>
+            </a:r>
+          </a:p>
+          <a:p>
+            <a:pPr marL="0" indent="0">
+              <a:buNone/>
+            </a:pPr>
+            <a:r>
+              <a:rPr lang="es-ES" dirty="0"/>
+              <a:t>- Mejorar la gestión de errores y logs para facilitar la depuración, sin necesidad de realizar </a:t>
+            </a:r>
+            <a:r>
+              <a:rPr lang="es-ES" dirty="0" err="1"/>
+              <a:t>prints</a:t>
+            </a:r>
+            <a:r>
+              <a:rPr lang="es-ES" dirty="0"/>
+              <a:t> en la consola.</a:t>
+            </a:r>
+          </a:p>
+        </p:txBody>
+      </p:sp>
+    </p:spTree>
+    <p:extLst>
+      <p:ext uri="{BB962C8B-B14F-4D97-AF65-F5344CB8AC3E}">
+        <p14:creationId xmlns:p14="http://schemas.microsoft.com/office/powerpoint/2010/main" val="4226691709"/>
+      </p:ext>
+    </p:extLst>
+  </p:cSld>
+  <p:clrMapOvr>
+    <a:masterClrMapping/>
+  </p:clrMapOvr>
+</p:sld>
+</file>
+
+<file path=ppt/slides/slide11.xml><?xml version="1.0" encoding="utf-8"?>
+<p:sld xmlns:a="http://schemas.openxmlformats.org/drawingml/2006/main" xmlns:r="http://schemas.openxmlformats.org/officeDocument/2006/relationships" xmlns:p="http://schemas.openxmlformats.org/presentationml/2006/main">
+  <p:cSld>
+    <p:spTree>
+      <p:nvGrpSpPr>
+        <p:cNvPr id="1" name=""/>
+        <p:cNvGrpSpPr/>
+        <p:nvPr/>
+      </p:nvGrpSpPr>
+      <p:grpSpPr>
+        <a:xfrm>
+          <a:off x="0" y="0"/>
+          <a:ext cx="0" cy="0"/>
+          <a:chOff x="0" y="0"/>
+          <a:chExt cx="0" cy="0"/>
+        </a:xfrm>
+      </p:grpSpPr>
+      <p:sp>
+        <p:nvSpPr>
+          <p:cNvPr id="2" name="Título 1">
+            <a:extLst>
+              <a:ext uri="{FF2B5EF4-FFF2-40B4-BE49-F238E27FC236}">
+                <a16:creationId xmlns:a16="http://schemas.microsoft.com/office/drawing/2014/main" id="{2BC89DC8-2231-1EB7-9244-DC72B1D1F58D}"/>
+              </a:ext>
+            </a:extLst>
+          </p:cNvPr>
+          <p:cNvSpPr>
+            <a:spLocks noGrp="1"/>
+          </p:cNvSpPr>
+          <p:nvPr>
+            <p:ph type="title"/>
+          </p:nvPr>
+        </p:nvSpPr>
+        <p:spPr/>
+        <p:txBody>
+          <a:bodyPr/>
+          <a:lstStyle/>
+          <a:p>
+            <a:r>
+              <a:rPr lang="es-ES" dirty="0"/>
+              <a:t>problemas</a:t>
+            </a:r>
+          </a:p>
+        </p:txBody>
+      </p:sp>
+      <p:sp>
+        <p:nvSpPr>
+          <p:cNvPr id="3" name="Marcador de contenido 2">
+            <a:extLst>
+              <a:ext uri="{FF2B5EF4-FFF2-40B4-BE49-F238E27FC236}">
+                <a16:creationId xmlns:a16="http://schemas.microsoft.com/office/drawing/2014/main" id="{2DD630A7-D4E4-6376-128A-43F70DEA5F84}"/>
+              </a:ext>
+            </a:extLst>
+          </p:cNvPr>
+          <p:cNvSpPr>
+            <a:spLocks noGrp="1"/>
+          </p:cNvSpPr>
+          <p:nvPr>
+            <p:ph idx="1"/>
+          </p:nvPr>
+        </p:nvSpPr>
+        <p:spPr/>
+        <p:txBody>
+          <a:bodyPr>
+            <a:normAutofit fontScale="85000" lnSpcReduction="10000"/>
+          </a:bodyPr>
+          <a:lstStyle/>
+          <a:p>
+            <a:pPr marL="0" indent="0">
+              <a:buNone/>
+            </a:pPr>
+            <a:r>
+              <a:rPr lang="es-ES" dirty="0"/>
+              <a:t>Durante la </a:t>
+            </a:r>
+            <a:r>
+              <a:rPr lang="es-ES" dirty="0" err="1"/>
+              <a:t>realizaón</a:t>
+            </a:r>
+            <a:r>
+              <a:rPr lang="es-ES" dirty="0"/>
+              <a:t> del proyecto se encontraron diferentes problemas, entre los que </a:t>
+            </a:r>
+            <a:r>
+              <a:rPr lang="es-ES" dirty="0" err="1"/>
+              <a:t>destancan</a:t>
+            </a:r>
+            <a:r>
+              <a:rPr lang="es-ES" dirty="0"/>
+              <a:t>:</a:t>
+            </a:r>
+          </a:p>
+          <a:p>
+            <a:pPr marL="0" indent="0">
+              <a:buNone/>
+            </a:pPr>
+            <a:r>
+              <a:rPr lang="es-ES" dirty="0"/>
+              <a:t>- Problemas con los permisos de los archivos de los certificados. Al no tener los permisos necesarios el sistema sacaba errores al intentar acceder a los certificados. Finalmente, pudo ser solucionado con el siguiente comando: sudo </a:t>
+            </a:r>
+            <a:r>
+              <a:rPr lang="es-ES" dirty="0" err="1"/>
+              <a:t>chmod</a:t>
+            </a:r>
+            <a:r>
+              <a:rPr lang="es-ES" dirty="0"/>
+              <a:t> -R 777 </a:t>
+            </a:r>
+            <a:r>
+              <a:rPr lang="es-ES" dirty="0" err="1"/>
+              <a:t>el_archivo</a:t>
+            </a:r>
+            <a:r>
+              <a:rPr lang="es-ES" dirty="0"/>
+              <a:t>.</a:t>
+            </a:r>
+          </a:p>
+          <a:p>
+            <a:pPr marL="0" indent="0">
+              <a:buNone/>
+            </a:pPr>
+            <a:r>
+              <a:rPr lang="es-ES" dirty="0"/>
+              <a:t>- Incompatibilidad entre claves y certificados. Se detectó que los valores MD5 de los certificados y las claves del publicador y suscriptor no coincidían, lo que impedía una correcta autenticación. Para solucionarlo, fue necesario regenerar tanto los certificados como las claves correspondientes.</a:t>
+            </a:r>
+          </a:p>
+        </p:txBody>
+      </p:sp>
+    </p:spTree>
+    <p:extLst>
+      <p:ext uri="{BB962C8B-B14F-4D97-AF65-F5344CB8AC3E}">
+        <p14:creationId xmlns:p14="http://schemas.microsoft.com/office/powerpoint/2010/main" val="787610654"/>
+      </p:ext>
+    </p:extLst>
+  </p:cSld>
+  <p:clrMapOvr>
+    <a:masterClrMapping/>
+  </p:clrMapOvr>
+</p:sld>
+</file>
+
+<file path=ppt/slides/slide12.xml><?xml version="1.0" encoding="utf-8"?>
+<p:sld xmlns:a="http://schemas.openxmlformats.org/drawingml/2006/main" xmlns:r="http://schemas.openxmlformats.org/officeDocument/2006/relationships" xmlns:p="http://schemas.openxmlformats.org/presentationml/2006/main">
+  <p:cSld>
+    <p:spTree>
+      <p:nvGrpSpPr>
+        <p:cNvPr id="1" name=""/>
+        <p:cNvGrpSpPr/>
+        <p:nvPr/>
+      </p:nvGrpSpPr>
+      <p:grpSpPr>
+        <a:xfrm>
+          <a:off x="0" y="0"/>
+          <a:ext cx="0" cy="0"/>
+          <a:chOff x="0" y="0"/>
+          <a:chExt cx="0" cy="0"/>
+        </a:xfrm>
+      </p:grpSpPr>
+      <p:sp>
+        <p:nvSpPr>
+          <p:cNvPr id="2" name="Título 1">
+            <a:extLst>
+              <a:ext uri="{FF2B5EF4-FFF2-40B4-BE49-F238E27FC236}">
+                <a16:creationId xmlns:a16="http://schemas.microsoft.com/office/drawing/2014/main" id="{879398A6-9A0C-408D-7E9D-AB41769606F4}"/>
+              </a:ext>
+            </a:extLst>
+          </p:cNvPr>
+          <p:cNvSpPr>
+            <a:spLocks noGrp="1"/>
+          </p:cNvSpPr>
+          <p:nvPr>
+            <p:ph type="title"/>
+          </p:nvPr>
+        </p:nvSpPr>
+        <p:spPr/>
+        <p:txBody>
+          <a:bodyPr/>
+          <a:lstStyle/>
+          <a:p>
+            <a:r>
+              <a:rPr lang="es-ES" dirty="0"/>
+              <a:t>alternativas</a:t>
+            </a:r>
+          </a:p>
+        </p:txBody>
+      </p:sp>
+      <p:sp>
+        <p:nvSpPr>
+          <p:cNvPr id="3" name="Marcador de contenido 2">
+            <a:extLst>
+              <a:ext uri="{FF2B5EF4-FFF2-40B4-BE49-F238E27FC236}">
+                <a16:creationId xmlns:a16="http://schemas.microsoft.com/office/drawing/2014/main" id="{45A0D9EB-53C1-FF01-B58A-8BCFB4870285}"/>
+              </a:ext>
+            </a:extLst>
+          </p:cNvPr>
+          <p:cNvSpPr>
+            <a:spLocks noGrp="1"/>
+          </p:cNvSpPr>
+          <p:nvPr>
+            <p:ph idx="1"/>
+          </p:nvPr>
+        </p:nvSpPr>
+        <p:spPr/>
+        <p:txBody>
+          <a:bodyPr>
+            <a:normAutofit fontScale="92500"/>
+          </a:bodyPr>
+          <a:lstStyle/>
+          <a:p>
+            <a:pPr marL="0" indent="0">
+              <a:buNone/>
+            </a:pPr>
+            <a:r>
+              <a:rPr lang="es-ES" dirty="0"/>
+              <a:t>Las siguientes podrían ser al </a:t>
+            </a:r>
+            <a:r>
+              <a:rPr lang="es-ES" dirty="0" err="1"/>
+              <a:t>ternativas</a:t>
+            </a:r>
+            <a:r>
+              <a:rPr lang="es-ES" dirty="0"/>
+              <a:t> posibles a </a:t>
+            </a:r>
+            <a:r>
+              <a:rPr lang="es-ES" dirty="0" err="1"/>
+              <a:t>implemnetar</a:t>
+            </a:r>
+            <a:r>
+              <a:rPr lang="es-ES" dirty="0"/>
+              <a:t> en el proyecto:</a:t>
+            </a:r>
+          </a:p>
+          <a:p>
+            <a:pPr marL="0" indent="0">
+              <a:buNone/>
+            </a:pPr>
+            <a:r>
+              <a:rPr lang="es-ES" dirty="0"/>
+              <a:t>- Utilizar PostgreSQL como base de datos en vez de SQLite. Tiene un mejor rendimiento en grandes volúmenes de datos, en comparación a SQLite que es más limitado.</a:t>
+            </a:r>
+          </a:p>
+          <a:p>
+            <a:pPr marL="0" indent="0">
+              <a:buNone/>
+            </a:pPr>
+            <a:r>
+              <a:rPr lang="es-ES" dirty="0"/>
+              <a:t>- Utilizar EMQX como </a:t>
+            </a:r>
+            <a:r>
+              <a:rPr lang="es-ES" dirty="0" err="1"/>
+              <a:t>broker</a:t>
+            </a:r>
+            <a:r>
+              <a:rPr lang="es-ES" dirty="0"/>
+              <a:t>. En comparación a </a:t>
+            </a:r>
+            <a:r>
+              <a:rPr lang="es-ES" dirty="0" err="1"/>
+              <a:t>Mosquitto</a:t>
+            </a:r>
+            <a:r>
+              <a:rPr lang="es-ES" dirty="0"/>
+              <a:t>, EMQX tiene un soporte para el </a:t>
+            </a:r>
+            <a:r>
+              <a:rPr lang="es-ES" dirty="0" err="1"/>
+              <a:t>clustering</a:t>
+            </a:r>
+            <a:r>
+              <a:rPr lang="es-ES" dirty="0"/>
+              <a:t>, lo que quiere decir que si un nodo falla sigue funcionando sin interrupciones. Además, permite manejar mas de 100 millones de conexiones simultáneas. </a:t>
+            </a:r>
+          </a:p>
+        </p:txBody>
+      </p:sp>
+    </p:spTree>
+    <p:extLst>
+      <p:ext uri="{BB962C8B-B14F-4D97-AF65-F5344CB8AC3E}">
+        <p14:creationId xmlns:p14="http://schemas.microsoft.com/office/powerpoint/2010/main" val="1418211955"/>
+      </p:ext>
+    </p:extLst>
+  </p:cSld>
+  <p:clrMapOvr>
+    <a:masterClrMapping/>
+  </p:clrMapOvr>
+</p:sld>
+</file>
+
 <file path=ppt/slides/slide2.xml><?xml version="1.0" encoding="utf-8"?>
 <p:sld xmlns:a="http://schemas.openxmlformats.org/drawingml/2006/main" xmlns:r="http://schemas.openxmlformats.org/officeDocument/2006/relationships" xmlns:p="http://schemas.openxmlformats.org/presentationml/2006/main">
   <p:cSld>
@@ -13174,7 +13585,7 @@
           <a:p>
             <a:r>
               <a:rPr lang="es-ES" dirty="0"/>
-              <a:t>En esta práctica, MQTT será usado como protocolo de comunicación entre un bróker y los clientes, tanto productor como consumidor.</a:t>
+              <a:t>En esta práctica, MQTT será usado como protocolo de comunicación entre un bróker y los clientes, tanto publicador como subscriptor.</a:t>
             </a:r>
           </a:p>
         </p:txBody>
@@ -13310,8 +13721,8 @@
         </p:blipFill>
         <p:spPr>
           <a:xfrm>
-            <a:off x="6222582" y="2807387"/>
-            <a:ext cx="4498557" cy="3329289"/>
+            <a:off x="6297515" y="2773090"/>
+            <a:ext cx="4831656" cy="3170510"/>
           </a:xfrm>
           <a:prstGeom prst="rect">
             <a:avLst/>
@@ -13637,7 +14048,7 @@
         </p:blipFill>
         <p:spPr>
           <a:xfrm>
-            <a:off x="1534837" y="2505317"/>
+            <a:off x="538795" y="2260388"/>
             <a:ext cx="3404535" cy="3728778"/>
           </a:xfrm>
           <a:prstGeom prst="rect">
@@ -13647,10 +14058,10 @@
       </p:pic>
       <p:pic>
         <p:nvPicPr>
-          <p:cNvPr id="9" name="Imagen 8">
+          <p:cNvPr id="7" name="Imagen 6">
             <a:extLst>
               <a:ext uri="{FF2B5EF4-FFF2-40B4-BE49-F238E27FC236}">
-                <a16:creationId xmlns:a16="http://schemas.microsoft.com/office/drawing/2014/main" id="{55606027-6727-EDEF-55D4-919363352199}"/>
+                <a16:creationId xmlns:a16="http://schemas.microsoft.com/office/drawing/2014/main" id="{600C2328-A049-C7CB-D242-BD691464E714}"/>
               </a:ext>
             </a:extLst>
           </p:cNvPr>
@@ -13672,43 +14083,8 @@
         </p:blipFill>
         <p:spPr>
           <a:xfrm>
-            <a:off x="6096000" y="2505317"/>
-            <a:ext cx="4313009" cy="2257498"/>
-          </a:xfrm>
-          <a:prstGeom prst="rect">
-            <a:avLst/>
-          </a:prstGeom>
-        </p:spPr>
-      </p:pic>
-      <p:pic>
-        <p:nvPicPr>
-          <p:cNvPr id="7" name="Imagen 6">
-            <a:extLst>
-              <a:ext uri="{FF2B5EF4-FFF2-40B4-BE49-F238E27FC236}">
-                <a16:creationId xmlns:a16="http://schemas.microsoft.com/office/drawing/2014/main" id="{600C2328-A049-C7CB-D242-BD691464E714}"/>
-              </a:ext>
-            </a:extLst>
-          </p:cNvPr>
-          <p:cNvPicPr>
-            <a:picLocks noChangeAspect="1"/>
-          </p:cNvPicPr>
-          <p:nvPr/>
-        </p:nvPicPr>
-        <p:blipFill>
-          <a:blip r:embed="rId4">
-            <a:extLst>
-              <a:ext uri="{28A0092B-C50C-407E-A947-70E740481C1C}">
-                <a14:useLocalDpi xmlns:a14="http://schemas.microsoft.com/office/drawing/2010/main" val="0"/>
-              </a:ext>
-            </a:extLst>
-          </a:blip>
-          <a:srcRect/>
-          <a:stretch/>
-        </p:blipFill>
-        <p:spPr>
-          <a:xfrm>
-            <a:off x="6096000" y="4861376"/>
-            <a:ext cx="4161319" cy="1578199"/>
+            <a:off x="4490170" y="2546578"/>
+            <a:ext cx="7148819" cy="2711222"/>
           </a:xfrm>
           <a:prstGeom prst="rect">
             <a:avLst/>
@@ -13729,6 +14105,180 @@
 </file>
 
 <file path=ppt/slides/slide7.xml><?xml version="1.0" encoding="utf-8"?>
+<p:sld xmlns:a="http://schemas.openxmlformats.org/drawingml/2006/main" xmlns:r="http://schemas.openxmlformats.org/officeDocument/2006/relationships" xmlns:p="http://schemas.openxmlformats.org/presentationml/2006/main">
+  <p:cSld>
+    <p:bg>
+      <p:bgPr>
+        <a:solidFill>
+          <a:schemeClr val="bg1"/>
+        </a:solidFill>
+        <a:effectLst/>
+      </p:bgPr>
+    </p:bg>
+    <p:spTree>
+      <p:nvGrpSpPr>
+        <p:cNvPr id="1" name="">
+          <a:extLst>
+            <a:ext uri="{FF2B5EF4-FFF2-40B4-BE49-F238E27FC236}">
+              <a16:creationId xmlns:a16="http://schemas.microsoft.com/office/drawing/2014/main" id="{C7E50DB2-A0AA-9CA7-120D-6418A4E88C3B}"/>
+            </a:ext>
+          </a:extLst>
+        </p:cNvPr>
+        <p:cNvGrpSpPr/>
+        <p:nvPr/>
+      </p:nvGrpSpPr>
+      <p:grpSpPr>
+        <a:xfrm>
+          <a:off x="0" y="0"/>
+          <a:ext cx="0" cy="0"/>
+          <a:chOff x="0" y="0"/>
+          <a:chExt cx="0" cy="0"/>
+        </a:xfrm>
+      </p:grpSpPr>
+      <p:sp>
+        <p:nvSpPr>
+          <p:cNvPr id="2" name="Título 1">
+            <a:extLst>
+              <a:ext uri="{FF2B5EF4-FFF2-40B4-BE49-F238E27FC236}">
+                <a16:creationId xmlns:a16="http://schemas.microsoft.com/office/drawing/2014/main" id="{FBA99C21-9947-E6CE-63C6-B76FE234A383}"/>
+              </a:ext>
+            </a:extLst>
+          </p:cNvPr>
+          <p:cNvSpPr>
+            <a:spLocks noGrp="1"/>
+          </p:cNvSpPr>
+          <p:nvPr>
+            <p:ph type="title"/>
+          </p:nvPr>
+        </p:nvSpPr>
+        <p:spPr>
+          <a:xfrm>
+            <a:off x="912627" y="983644"/>
+            <a:ext cx="9895367" cy="1155954"/>
+          </a:xfrm>
+        </p:spPr>
+        <p:txBody>
+          <a:bodyPr vert="horz" lIns="91440" tIns="45720" rIns="91440" bIns="45720" rtlCol="0" anchor="b">
+            <a:normAutofit fontScale="90000"/>
+          </a:bodyPr>
+          <a:lstStyle/>
+          <a:p>
+            <a:r>
+              <a:rPr lang="en-US" sz="4800"/>
+              <a:t>Funcionamiento: Cliente Subscriptor</a:t>
+            </a:r>
+          </a:p>
+        </p:txBody>
+      </p:sp>
+      <p:pic>
+        <p:nvPicPr>
+          <p:cNvPr id="9" name="Imagen 8">
+            <a:extLst>
+              <a:ext uri="{FF2B5EF4-FFF2-40B4-BE49-F238E27FC236}">
+                <a16:creationId xmlns:a16="http://schemas.microsoft.com/office/drawing/2014/main" id="{ECB121CA-D7FF-7A82-D637-E8068C734757}"/>
+              </a:ext>
+            </a:extLst>
+          </p:cNvPr>
+          <p:cNvPicPr>
+            <a:picLocks noChangeAspect="1"/>
+          </p:cNvPicPr>
+          <p:nvPr/>
+        </p:nvPicPr>
+        <p:blipFill>
+          <a:blip r:embed="rId2">
+            <a:extLst>
+              <a:ext uri="{28A0092B-C50C-407E-A947-70E740481C1C}">
+                <a14:useLocalDpi xmlns:a14="http://schemas.microsoft.com/office/drawing/2010/main" val="0"/>
+              </a:ext>
+            </a:extLst>
+          </a:blip>
+          <a:srcRect/>
+          <a:stretch/>
+        </p:blipFill>
+        <p:spPr>
+          <a:xfrm>
+            <a:off x="112566" y="3723537"/>
+            <a:ext cx="5053779" cy="2645229"/>
+          </a:xfrm>
+          <a:prstGeom prst="rect">
+            <a:avLst/>
+          </a:prstGeom>
+        </p:spPr>
+      </p:pic>
+      <p:pic>
+        <p:nvPicPr>
+          <p:cNvPr id="11" name="Imagen 10">
+            <a:extLst>
+              <a:ext uri="{FF2B5EF4-FFF2-40B4-BE49-F238E27FC236}">
+                <a16:creationId xmlns:a16="http://schemas.microsoft.com/office/drawing/2014/main" id="{8F8D8F98-B23E-9B1D-E501-5780FDA018B4}"/>
+              </a:ext>
+            </a:extLst>
+          </p:cNvPr>
+          <p:cNvPicPr>
+            <a:picLocks noChangeAspect="1"/>
+          </p:cNvPicPr>
+          <p:nvPr/>
+        </p:nvPicPr>
+        <p:blipFill>
+          <a:blip r:embed="rId3"/>
+          <a:stretch>
+            <a:fillRect/>
+          </a:stretch>
+        </p:blipFill>
+        <p:spPr>
+          <a:xfrm>
+            <a:off x="313518" y="2286621"/>
+            <a:ext cx="5782482" cy="847843"/>
+          </a:xfrm>
+          <a:prstGeom prst="rect">
+            <a:avLst/>
+          </a:prstGeom>
+        </p:spPr>
+      </p:pic>
+      <p:pic>
+        <p:nvPicPr>
+          <p:cNvPr id="13" name="Imagen 12">
+            <a:extLst>
+              <a:ext uri="{FF2B5EF4-FFF2-40B4-BE49-F238E27FC236}">
+                <a16:creationId xmlns:a16="http://schemas.microsoft.com/office/drawing/2014/main" id="{A2360107-EFAE-8230-C301-C5C97704B59B}"/>
+              </a:ext>
+            </a:extLst>
+          </p:cNvPr>
+          <p:cNvPicPr>
+            <a:picLocks noChangeAspect="1"/>
+          </p:cNvPicPr>
+          <p:nvPr/>
+        </p:nvPicPr>
+        <p:blipFill>
+          <a:blip r:embed="rId4"/>
+          <a:stretch>
+            <a:fillRect/>
+          </a:stretch>
+        </p:blipFill>
+        <p:spPr>
+          <a:xfrm>
+            <a:off x="5243909" y="3261582"/>
+            <a:ext cx="6835525" cy="2913642"/>
+          </a:xfrm>
+          <a:prstGeom prst="rect">
+            <a:avLst/>
+          </a:prstGeom>
+        </p:spPr>
+      </p:pic>
+    </p:spTree>
+    <p:extLst>
+      <p:ext uri="{BB962C8B-B14F-4D97-AF65-F5344CB8AC3E}">
+        <p14:creationId xmlns:p14="http://schemas.microsoft.com/office/powerpoint/2010/main" val="4114669019"/>
+      </p:ext>
+    </p:extLst>
+  </p:cSld>
+  <p:clrMapOvr>
+    <a:masterClrMapping/>
+  </p:clrMapOvr>
+</p:sld>
+</file>
+
+<file path=ppt/slides/slide8.xml><?xml version="1.0" encoding="utf-8"?>
 <p:sld xmlns:a="http://schemas.openxmlformats.org/drawingml/2006/main" xmlns:r="http://schemas.openxmlformats.org/officeDocument/2006/relationships" xmlns:p="http://schemas.openxmlformats.org/presentationml/2006/main">
   <p:cSld>
     <p:spTree>
@@ -13773,36 +14323,6 @@
           </a:p>
         </p:txBody>
       </p:sp>
-      <p:pic>
-        <p:nvPicPr>
-          <p:cNvPr id="5" name="Imagen 4">
-            <a:extLst>
-              <a:ext uri="{FF2B5EF4-FFF2-40B4-BE49-F238E27FC236}">
-                <a16:creationId xmlns:a16="http://schemas.microsoft.com/office/drawing/2014/main" id="{7524B96F-5133-5EB3-0DE3-642D75CC5D17}"/>
-              </a:ext>
-            </a:extLst>
-          </p:cNvPr>
-          <p:cNvPicPr>
-            <a:picLocks noChangeAspect="1"/>
-          </p:cNvPicPr>
-          <p:nvPr/>
-        </p:nvPicPr>
-        <p:blipFill>
-          <a:blip r:embed="rId2"/>
-          <a:stretch>
-            <a:fillRect/>
-          </a:stretch>
-        </p:blipFill>
-        <p:spPr>
-          <a:xfrm>
-            <a:off x="10001692" y="3529430"/>
-            <a:ext cx="1045719" cy="2770239"/>
-          </a:xfrm>
-          <a:prstGeom prst="rect">
-            <a:avLst/>
-          </a:prstGeom>
-        </p:spPr>
-      </p:pic>
       <p:sp>
         <p:nvSpPr>
           <p:cNvPr id="6" name="CuadroTexto 5">
@@ -13889,10 +14409,10 @@
       </p:sp>
       <p:pic>
         <p:nvPicPr>
-          <p:cNvPr id="4" name="Imagen 3">
+          <p:cNvPr id="7" name="Imagen 6">
             <a:extLst>
               <a:ext uri="{FF2B5EF4-FFF2-40B4-BE49-F238E27FC236}">
-                <a16:creationId xmlns:a16="http://schemas.microsoft.com/office/drawing/2014/main" id="{A4189831-A1BC-ACD5-8FCC-FD7BD03675F8}"/>
+                <a16:creationId xmlns:a16="http://schemas.microsoft.com/office/drawing/2014/main" id="{7863A269-C114-8F92-696F-73724271A0D6}"/>
               </a:ext>
             </a:extLst>
           </p:cNvPr>
@@ -13902,75 +14422,15 @@
           <p:nvPr/>
         </p:nvPicPr>
         <p:blipFill>
-          <a:blip r:embed="rId3"/>
+          <a:blip r:embed="rId2"/>
           <a:stretch>
             <a:fillRect/>
           </a:stretch>
         </p:blipFill>
         <p:spPr>
           <a:xfrm>
-            <a:off x="6487596" y="3529430"/>
-            <a:ext cx="3133865" cy="2862322"/>
-          </a:xfrm>
-          <a:prstGeom prst="rect">
-            <a:avLst/>
-          </a:prstGeom>
-        </p:spPr>
-      </p:pic>
-      <p:pic>
-        <p:nvPicPr>
-          <p:cNvPr id="8" name="Imagen 7">
-            <a:extLst>
-              <a:ext uri="{FF2B5EF4-FFF2-40B4-BE49-F238E27FC236}">
-                <a16:creationId xmlns:a16="http://schemas.microsoft.com/office/drawing/2014/main" id="{093521FC-3461-4FD7-0429-5460F822E698}"/>
-              </a:ext>
-            </a:extLst>
-          </p:cNvPr>
-          <p:cNvPicPr>
-            <a:picLocks noChangeAspect="1"/>
-          </p:cNvPicPr>
-          <p:nvPr/>
-        </p:nvPicPr>
-        <p:blipFill>
-          <a:blip r:embed="rId4"/>
-          <a:stretch>
-            <a:fillRect/>
-          </a:stretch>
-        </p:blipFill>
-        <p:spPr>
-          <a:xfrm>
-            <a:off x="3328760" y="3529430"/>
-            <a:ext cx="2778605" cy="2862322"/>
-          </a:xfrm>
-          <a:prstGeom prst="rect">
-            <a:avLst/>
-          </a:prstGeom>
-        </p:spPr>
-      </p:pic>
-      <p:pic>
-        <p:nvPicPr>
-          <p:cNvPr id="10" name="Imagen 9">
-            <a:extLst>
-              <a:ext uri="{FF2B5EF4-FFF2-40B4-BE49-F238E27FC236}">
-                <a16:creationId xmlns:a16="http://schemas.microsoft.com/office/drawing/2014/main" id="{626DE0E8-C555-9062-FF61-ECE655BDAC50}"/>
-              </a:ext>
-            </a:extLst>
-          </p:cNvPr>
-          <p:cNvPicPr>
-            <a:picLocks noChangeAspect="1"/>
-          </p:cNvPicPr>
-          <p:nvPr/>
-        </p:nvPicPr>
-        <p:blipFill>
-          <a:blip r:embed="rId5"/>
-          <a:stretch>
-            <a:fillRect/>
-          </a:stretch>
-        </p:blipFill>
-        <p:spPr>
-          <a:xfrm>
-            <a:off x="7289703" y="2221430"/>
-            <a:ext cx="3757708" cy="753144"/>
+            <a:off x="6851137" y="1742882"/>
+            <a:ext cx="3354220" cy="4807715"/>
           </a:xfrm>
           <a:prstGeom prst="rect">
             <a:avLst/>
@@ -13990,7 +14450,7 @@
 </p:sld>
 </file>
 
-<file path=ppt/slides/slide8.xml><?xml version="1.0" encoding="utf-8"?>
+<file path=ppt/slides/slide9.xml><?xml version="1.0" encoding="utf-8"?>
 <p:sld xmlns:a="http://schemas.openxmlformats.org/drawingml/2006/main" xmlns:r="http://schemas.openxmlformats.org/officeDocument/2006/relationships" xmlns:p="http://schemas.openxmlformats.org/presentationml/2006/main">
   <p:cSld>
     <p:spTree>
@@ -14521,6 +14981,15 @@
 </file>
 
 <file path=customXml/item2.xml><?xml version="1.0" encoding="utf-8"?>
+<?mso-contentType ?>
+<FormTemplates xmlns="http://schemas.microsoft.com/sharepoint/v3/contenttype/forms">
+  <Display>DocumentLibraryForm</Display>
+  <Edit>DocumentLibraryForm</Edit>
+  <New>DocumentLibraryForm</New>
+</FormTemplates>
+</file>
+
+<file path=customXml/item3.xml><?xml version="1.0" encoding="utf-8"?>
 <ct:contentTypeSchema xmlns:ct="http://schemas.microsoft.com/office/2006/metadata/contentType" xmlns:ma="http://schemas.microsoft.com/office/2006/metadata/properties/metaAttributes" ct:_="" ma:_="" ma:contentTypeName="Documento" ma:contentTypeID="0x010100B311B9E66B74A74F85FCA1A5354868B3" ma:contentTypeVersion="14" ma:contentTypeDescription="Crear nuevo documento." ma:contentTypeScope="" ma:versionID="a4cb7d73271d44f68eb8b86d9b73e107">
   <xsd:schema xmlns:xsd="http://www.w3.org/2001/XMLSchema" xmlns:xs="http://www.w3.org/2001/XMLSchema" xmlns:p="http://schemas.microsoft.com/office/2006/metadata/properties" xmlns:ns3="c846ee4d-cd50-40aa-8c53-0404ef98127e" xmlns:ns4="8b6f5009-b8e6-4fa2-b519-a242ae5c6222" targetNamespace="http://schemas.microsoft.com/office/2006/metadata/properties" ma:root="true" ma:fieldsID="d063454d8f6584d411c4cc7c42ccac14" ns3:_="" ns4:_="">
     <xsd:import namespace="c846ee4d-cd50-40aa-8c53-0404ef98127e"/>
@@ -14747,15 +15216,6 @@
 </ct:contentTypeSchema>
 </file>
 
-<file path=customXml/item3.xml><?xml version="1.0" encoding="utf-8"?>
-<?mso-contentType ?>
-<FormTemplates xmlns="http://schemas.microsoft.com/sharepoint/v3/contenttype/forms">
-  <Display>DocumentLibraryForm</Display>
-  <Edit>DocumentLibraryForm</Edit>
-  <New>DocumentLibraryForm</New>
-</FormTemplates>
-</file>
-
 <file path=customXml/itemProps1.xml><?xml version="1.0" encoding="utf-8"?>
 <ds:datastoreItem xmlns:ds="http://schemas.openxmlformats.org/officeDocument/2006/customXml" ds:itemID="{DA282525-D9ED-4CA2-BEE9-F86F16EB38CD}">
   <ds:schemaRefs>
@@ -14774,6 +15234,14 @@
 </file>
 
 <file path=customXml/itemProps2.xml><?xml version="1.0" encoding="utf-8"?>
+<ds:datastoreItem xmlns:ds="http://schemas.openxmlformats.org/officeDocument/2006/customXml" ds:itemID="{9F400E30-8A4B-463E-ABDB-0E3F7E97BCA0}">
+  <ds:schemaRefs>
+    <ds:schemaRef ds:uri="http://schemas.microsoft.com/sharepoint/v3/contenttype/forms"/>
+  </ds:schemaRefs>
+</ds:datastoreItem>
+</file>
+
+<file path=customXml/itemProps3.xml><?xml version="1.0" encoding="utf-8"?>
 <ds:datastoreItem xmlns:ds="http://schemas.openxmlformats.org/officeDocument/2006/customXml" ds:itemID="{F358E5F1-235D-47B5-A2AB-525184B8E8D3}">
   <ds:schemaRefs>
     <ds:schemaRef ds:uri="http://schemas.microsoft.com/office/2006/metadata/contentType"/>
@@ -14790,12 +15258,4 @@
     <ds:schemaRef ds:uri="http://schemas.microsoft.com/internal/obd"/>
   </ds:schemaRefs>
 </ds:datastoreItem>
-</file>
-
-<file path=customXml/itemProps3.xml><?xml version="1.0" encoding="utf-8"?>
-<ds:datastoreItem xmlns:ds="http://schemas.openxmlformats.org/officeDocument/2006/customXml" ds:itemID="{9F400E30-8A4B-463E-ABDB-0E3F7E97BCA0}">
-  <ds:schemaRefs>
-    <ds:schemaRef ds:uri="http://schemas.microsoft.com/sharepoint/v3/contenttype/forms"/>
-  </ds:schemaRefs>
-</ds:datastoreItem>
 </file>
</xml_diff>